<commit_message>
Trabajo en el poster CEEBI
</commit_message>
<xml_diff>
--- a/resultados/poster CEEBI/Poster CEEBI TFG.pptx
+++ b/resultados/poster CEEBI/Poster CEEBI TFG.pptx
@@ -254,7 +254,7 @@
           <a:p>
             <a:fld id="{059ACE22-8852-4AB5-AC4C-388E9F46BA1D}" type="datetimeFigureOut">
               <a:rPr lang="es-ES" smtClean="0"/>
-              <a:t>16/06/2023</a:t>
+              <a:t>18/06/2023</a:t>
             </a:fld>
             <a:endParaRPr lang="es-ES"/>
           </a:p>
@@ -424,7 +424,7 @@
           <a:p>
             <a:fld id="{059ACE22-8852-4AB5-AC4C-388E9F46BA1D}" type="datetimeFigureOut">
               <a:rPr lang="es-ES" smtClean="0"/>
-              <a:t>16/06/2023</a:t>
+              <a:t>18/06/2023</a:t>
             </a:fld>
             <a:endParaRPr lang="es-ES"/>
           </a:p>
@@ -604,7 +604,7 @@
           <a:p>
             <a:fld id="{059ACE22-8852-4AB5-AC4C-388E9F46BA1D}" type="datetimeFigureOut">
               <a:rPr lang="es-ES" smtClean="0"/>
-              <a:t>16/06/2023</a:t>
+              <a:t>18/06/2023</a:t>
             </a:fld>
             <a:endParaRPr lang="es-ES"/>
           </a:p>
@@ -774,7 +774,7 @@
           <a:p>
             <a:fld id="{059ACE22-8852-4AB5-AC4C-388E9F46BA1D}" type="datetimeFigureOut">
               <a:rPr lang="es-ES" smtClean="0"/>
-              <a:t>16/06/2023</a:t>
+              <a:t>18/06/2023</a:t>
             </a:fld>
             <a:endParaRPr lang="es-ES"/>
           </a:p>
@@ -1018,7 +1018,7 @@
           <a:p>
             <a:fld id="{059ACE22-8852-4AB5-AC4C-388E9F46BA1D}" type="datetimeFigureOut">
               <a:rPr lang="es-ES" smtClean="0"/>
-              <a:t>16/06/2023</a:t>
+              <a:t>18/06/2023</a:t>
             </a:fld>
             <a:endParaRPr lang="es-ES"/>
           </a:p>
@@ -1250,7 +1250,7 @@
           <a:p>
             <a:fld id="{059ACE22-8852-4AB5-AC4C-388E9F46BA1D}" type="datetimeFigureOut">
               <a:rPr lang="es-ES" smtClean="0"/>
-              <a:t>16/06/2023</a:t>
+              <a:t>18/06/2023</a:t>
             </a:fld>
             <a:endParaRPr lang="es-ES"/>
           </a:p>
@@ -1617,7 +1617,7 @@
           <a:p>
             <a:fld id="{059ACE22-8852-4AB5-AC4C-388E9F46BA1D}" type="datetimeFigureOut">
               <a:rPr lang="es-ES" smtClean="0"/>
-              <a:t>16/06/2023</a:t>
+              <a:t>18/06/2023</a:t>
             </a:fld>
             <a:endParaRPr lang="es-ES"/>
           </a:p>
@@ -1735,7 +1735,7 @@
           <a:p>
             <a:fld id="{059ACE22-8852-4AB5-AC4C-388E9F46BA1D}" type="datetimeFigureOut">
               <a:rPr lang="es-ES" smtClean="0"/>
-              <a:t>16/06/2023</a:t>
+              <a:t>18/06/2023</a:t>
             </a:fld>
             <a:endParaRPr lang="es-ES"/>
           </a:p>
@@ -1830,7 +1830,7 @@
           <a:p>
             <a:fld id="{059ACE22-8852-4AB5-AC4C-388E9F46BA1D}" type="datetimeFigureOut">
               <a:rPr lang="es-ES" smtClean="0"/>
-              <a:t>16/06/2023</a:t>
+              <a:t>18/06/2023</a:t>
             </a:fld>
             <a:endParaRPr lang="es-ES"/>
           </a:p>
@@ -2107,7 +2107,7 @@
           <a:p>
             <a:fld id="{059ACE22-8852-4AB5-AC4C-388E9F46BA1D}" type="datetimeFigureOut">
               <a:rPr lang="es-ES" smtClean="0"/>
-              <a:t>16/06/2023</a:t>
+              <a:t>18/06/2023</a:t>
             </a:fld>
             <a:endParaRPr lang="es-ES"/>
           </a:p>
@@ -2364,7 +2364,7 @@
           <a:p>
             <a:fld id="{059ACE22-8852-4AB5-AC4C-388E9F46BA1D}" type="datetimeFigureOut">
               <a:rPr lang="es-ES" smtClean="0"/>
-              <a:t>16/06/2023</a:t>
+              <a:t>18/06/2023</a:t>
             </a:fld>
             <a:endParaRPr lang="es-ES"/>
           </a:p>
@@ -2577,7 +2577,7 @@
           <a:p>
             <a:fld id="{059ACE22-8852-4AB5-AC4C-388E9F46BA1D}" type="datetimeFigureOut">
               <a:rPr lang="es-ES" smtClean="0"/>
-              <a:t>16/06/2023</a:t>
+              <a:t>18/06/2023</a:t>
             </a:fld>
             <a:endParaRPr lang="es-ES"/>
           </a:p>
@@ -2996,8 +2996,8 @@
         </p:nvGrpSpPr>
         <p:grpSpPr>
           <a:xfrm>
-            <a:off x="751444" y="10410157"/>
-            <a:ext cx="19949015" cy="5411758"/>
+            <a:off x="13917126" y="4795249"/>
+            <a:ext cx="6676965" cy="10070762"/>
             <a:chOff x="11583323" y="6375151"/>
             <a:chExt cx="9800303" cy="5411758"/>
           </a:xfrm>
@@ -3016,12 +3016,12 @@
           </p:nvSpPr>
           <p:spPr>
             <a:xfrm>
-              <a:off x="11583324" y="6625720"/>
-              <a:ext cx="9800301" cy="5161189"/>
+              <a:off x="11583323" y="6383325"/>
+              <a:ext cx="9800302" cy="5403584"/>
             </a:xfrm>
             <a:prstGeom prst="roundRect">
               <a:avLst>
-                <a:gd name="adj" fmla="val 1492"/>
+                <a:gd name="adj" fmla="val 7028"/>
               </a:avLst>
             </a:prstGeom>
             <a:gradFill flip="none" rotWithShape="1">
@@ -3095,8 +3095,8 @@
           </p:nvSpPr>
           <p:spPr>
             <a:xfrm>
-              <a:off x="11583325" y="6375151"/>
-              <a:ext cx="9800301" cy="511629"/>
+              <a:off x="11583324" y="6375151"/>
+              <a:ext cx="9800302" cy="367107"/>
             </a:xfrm>
             <a:prstGeom prst="roundRect">
               <a:avLst/>
@@ -3151,54 +3151,6 @@
             </a:p>
           </p:txBody>
         </p:sp>
-        <p:sp>
-          <p:nvSpPr>
-            <p:cNvPr id="13" name="CuadroTexto 12">
-              <a:extLst>
-                <a:ext uri="{FF2B5EF4-FFF2-40B4-BE49-F238E27FC236}">
-                  <a16:creationId xmlns:a16="http://schemas.microsoft.com/office/drawing/2014/main" id="{58B436FB-5DBB-C128-5AD4-855BC904EF83}"/>
-                </a:ext>
-              </a:extLst>
-            </p:cNvPr>
-            <p:cNvSpPr txBox="1"/>
-            <p:nvPr/>
-          </p:nvSpPr>
-          <p:spPr>
-            <a:xfrm>
-              <a:off x="11583323" y="6425665"/>
-              <a:ext cx="8288712" cy="400110"/>
-            </a:xfrm>
-            <a:prstGeom prst="rect">
-              <a:avLst/>
-            </a:prstGeom>
-            <a:noFill/>
-          </p:spPr>
-          <p:txBody>
-            <a:bodyPr wrap="square" rtlCol="0">
-              <a:spAutoFit/>
-            </a:bodyPr>
-            <a:lstStyle/>
-            <a:p>
-              <a:r>
-                <a:rPr lang="es-ES" sz="2000" b="1" dirty="0">
-                  <a:solidFill>
-                    <a:schemeClr val="bg1"/>
-                  </a:solidFill>
-                  <a:latin typeface="Cooper Hewitt Semibold" pitchFamily="2" charset="0"/>
-                  <a:ea typeface="Cooper Hewitt Semibold" pitchFamily="2" charset="0"/>
-                </a:rPr>
-                <a:t>MATERIALES Y MÉTODOS</a:t>
-              </a:r>
-              <a:endParaRPr lang="x-none" sz="2000" b="1" dirty="0">
-                <a:solidFill>
-                  <a:schemeClr val="bg1"/>
-                </a:solidFill>
-                <a:latin typeface="Cooper Hewitt Semibold" pitchFamily="2" charset="0"/>
-                <a:ea typeface="Cooper Hewitt Semibold" pitchFamily="2" charset="0"/>
-              </a:endParaRPr>
-            </a:p>
-          </p:txBody>
-        </p:sp>
       </p:grpSp>
       <p:grpSp>
         <p:nvGrpSpPr>
@@ -3214,8 +3166,8 @@
         </p:nvGrpSpPr>
         <p:grpSpPr>
           <a:xfrm>
-            <a:off x="712425" y="16195538"/>
-            <a:ext cx="20143677" cy="10730624"/>
+            <a:off x="712425" y="15219466"/>
+            <a:ext cx="19881665" cy="10730624"/>
             <a:chOff x="4153823" y="12991536"/>
             <a:chExt cx="9800303" cy="10730624"/>
           </a:xfrm>
@@ -3239,7 +3191,7 @@
             </a:xfrm>
             <a:prstGeom prst="roundRect">
               <a:avLst>
-                <a:gd name="adj" fmla="val 1492"/>
+                <a:gd name="adj" fmla="val 3534"/>
               </a:avLst>
             </a:prstGeom>
             <a:gradFill flip="none" rotWithShape="1">
@@ -3407,7 +3359,7 @@
         </p:nvGrpSpPr>
         <p:grpSpPr>
           <a:xfrm>
-            <a:off x="4106678" y="10990742"/>
+            <a:off x="21881927" y="6201610"/>
             <a:ext cx="12977286" cy="4958661"/>
             <a:chOff x="974247" y="21305958"/>
             <a:chExt cx="8794416" cy="2874652"/>
@@ -4446,12 +4398,281 @@
           </p:grpSp>
         </p:grpSp>
       </p:grpSp>
+      <p:sp>
+        <p:nvSpPr>
+          <p:cNvPr id="4" name="Rectángulo: esquinas redondeadas 3">
+            <a:extLst>
+              <a:ext uri="{FF2B5EF4-FFF2-40B4-BE49-F238E27FC236}">
+                <a16:creationId xmlns:a16="http://schemas.microsoft.com/office/drawing/2014/main" id="{A673775D-BC9E-1292-FFF4-A0D0B80D4A6A}"/>
+              </a:ext>
+            </a:extLst>
+          </p:cNvPr>
+          <p:cNvSpPr/>
+          <p:nvPr/>
+        </p:nvSpPr>
+        <p:spPr>
+          <a:xfrm>
+            <a:off x="712426" y="5060710"/>
+            <a:ext cx="12633924" cy="7581864"/>
+          </a:xfrm>
+          <a:prstGeom prst="roundRect">
+            <a:avLst>
+              <a:gd name="adj" fmla="val 6200"/>
+            </a:avLst>
+          </a:prstGeom>
+          <a:gradFill flip="none" rotWithShape="1">
+            <a:gsLst>
+              <a:gs pos="0">
+                <a:schemeClr val="bg1">
+                  <a:lumMod val="95000"/>
+                  <a:shade val="30000"/>
+                  <a:satMod val="115000"/>
+                </a:schemeClr>
+              </a:gs>
+              <a:gs pos="0">
+                <a:schemeClr val="bg1">
+                  <a:lumMod val="95000"/>
+                  <a:shade val="67500"/>
+                  <a:satMod val="115000"/>
+                  <a:alpha val="80000"/>
+                </a:schemeClr>
+              </a:gs>
+              <a:gs pos="47000">
+                <a:schemeClr val="bg1">
+                  <a:lumMod val="95000"/>
+                  <a:shade val="100000"/>
+                  <a:satMod val="115000"/>
+                </a:schemeClr>
+              </a:gs>
+            </a:gsLst>
+            <a:lin ang="13500000" scaled="1"/>
+            <a:tileRect/>
+          </a:gradFill>
+          <a:ln>
+            <a:noFill/>
+          </a:ln>
+        </p:spPr>
+        <p:style>
+          <a:lnRef idx="2">
+            <a:schemeClr val="accent1">
+              <a:shade val="50000"/>
+            </a:schemeClr>
+          </a:lnRef>
+          <a:fillRef idx="1">
+            <a:schemeClr val="accent1"/>
+          </a:fillRef>
+          <a:effectRef idx="0">
+            <a:schemeClr val="accent1"/>
+          </a:effectRef>
+          <a:fontRef idx="minor">
+            <a:schemeClr val="lt1"/>
+          </a:fontRef>
+        </p:style>
+        <p:txBody>
+          <a:bodyPr rtlCol="0" anchor="ctr"/>
+          <a:lstStyle/>
+          <a:p>
+            <a:pPr algn="ctr"/>
+            <a:endParaRPr lang="es-ES" dirty="0"/>
+          </a:p>
+        </p:txBody>
+      </p:sp>
+      <p:sp>
+        <p:nvSpPr>
+          <p:cNvPr id="5" name="Rectángulo: esquinas redondeadas 4">
+            <a:extLst>
+              <a:ext uri="{FF2B5EF4-FFF2-40B4-BE49-F238E27FC236}">
+                <a16:creationId xmlns:a16="http://schemas.microsoft.com/office/drawing/2014/main" id="{8A818B2A-457B-91EC-5170-D9BFBB54CD6B}"/>
+              </a:ext>
+            </a:extLst>
+          </p:cNvPr>
+          <p:cNvSpPr/>
+          <p:nvPr/>
+        </p:nvSpPr>
+        <p:spPr>
+          <a:xfrm>
+            <a:off x="712427" y="4810141"/>
+            <a:ext cx="12633924" cy="668798"/>
+          </a:xfrm>
+          <a:prstGeom prst="roundRect">
+            <a:avLst/>
+          </a:prstGeom>
+          <a:gradFill flip="none" rotWithShape="1">
+            <a:gsLst>
+              <a:gs pos="100000">
+                <a:schemeClr val="accent4">
+                  <a:lumMod val="50000"/>
+                </a:schemeClr>
+              </a:gs>
+              <a:gs pos="0">
+                <a:schemeClr val="accent4"/>
+              </a:gs>
+              <a:gs pos="37000">
+                <a:srgbClr val="6EB2AB"/>
+              </a:gs>
+            </a:gsLst>
+            <a:lin ang="2700000" scaled="1"/>
+            <a:tileRect/>
+          </a:gradFill>
+          <a:ln>
+            <a:noFill/>
+          </a:ln>
+        </p:spPr>
+        <p:style>
+          <a:lnRef idx="2">
+            <a:schemeClr val="accent1">
+              <a:shade val="50000"/>
+            </a:schemeClr>
+          </a:lnRef>
+          <a:fillRef idx="1">
+            <a:schemeClr val="accent1"/>
+          </a:fillRef>
+          <a:effectRef idx="0">
+            <a:schemeClr val="accent1"/>
+          </a:effectRef>
+          <a:fontRef idx="minor">
+            <a:schemeClr val="lt1"/>
+          </a:fontRef>
+        </p:style>
+        <p:txBody>
+          <a:bodyPr rtlCol="0" anchor="ctr"/>
+          <a:lstStyle/>
+          <a:p>
+            <a:pPr algn="ctr"/>
+            <a:endParaRPr lang="es-ES"/>
+          </a:p>
+        </p:txBody>
+      </p:sp>
+      <p:sp>
+        <p:nvSpPr>
+          <p:cNvPr id="6" name="CuadroTexto 5">
+            <a:extLst>
+              <a:ext uri="{FF2B5EF4-FFF2-40B4-BE49-F238E27FC236}">
+                <a16:creationId xmlns:a16="http://schemas.microsoft.com/office/drawing/2014/main" id="{771F5443-2AC0-6464-23E7-CB153FAF3CDD}"/>
+              </a:ext>
+            </a:extLst>
+          </p:cNvPr>
+          <p:cNvSpPr txBox="1"/>
+          <p:nvPr/>
+        </p:nvSpPr>
+        <p:spPr>
+          <a:xfrm>
+            <a:off x="789534" y="4883826"/>
+            <a:ext cx="8288712" cy="523220"/>
+          </a:xfrm>
+          <a:prstGeom prst="rect">
+            <a:avLst/>
+          </a:prstGeom>
+          <a:noFill/>
+        </p:spPr>
+        <p:txBody>
+          <a:bodyPr wrap="square" rtlCol="0">
+            <a:spAutoFit/>
+          </a:bodyPr>
+          <a:lstStyle/>
+          <a:p>
+            <a:r>
+              <a:rPr lang="es-ES" sz="2800" b="1" dirty="0">
+                <a:solidFill>
+                  <a:schemeClr val="bg1"/>
+                </a:solidFill>
+                <a:latin typeface="Cooper Hewitt Semibold" pitchFamily="2" charset="0"/>
+                <a:ea typeface="Cooper Hewitt Semibold" pitchFamily="2" charset="0"/>
+              </a:rPr>
+              <a:t>INTRODUCCIÓN</a:t>
+            </a:r>
+            <a:endParaRPr lang="x-none" sz="2400" b="1" dirty="0">
+              <a:solidFill>
+                <a:schemeClr val="bg1"/>
+              </a:solidFill>
+              <a:latin typeface="Cooper Hewitt Semibold" pitchFamily="2" charset="0"/>
+              <a:ea typeface="Cooper Hewitt Semibold" pitchFamily="2" charset="0"/>
+            </a:endParaRPr>
+          </a:p>
+        </p:txBody>
+      </p:sp>
+      <p:sp>
+        <p:nvSpPr>
+          <p:cNvPr id="8" name="CuadroTexto 7">
+            <a:extLst>
+              <a:ext uri="{FF2B5EF4-FFF2-40B4-BE49-F238E27FC236}">
+                <a16:creationId xmlns:a16="http://schemas.microsoft.com/office/drawing/2014/main" id="{023818B1-24F6-1BDF-9235-7B639963B35B}"/>
+              </a:ext>
+            </a:extLst>
+          </p:cNvPr>
+          <p:cNvSpPr txBox="1"/>
+          <p:nvPr/>
+        </p:nvSpPr>
+        <p:spPr>
+          <a:xfrm>
+            <a:off x="6051500" y="5734154"/>
+            <a:ext cx="6925198" cy="2062103"/>
+          </a:xfrm>
+          <a:prstGeom prst="rect">
+            <a:avLst/>
+          </a:prstGeom>
+          <a:noFill/>
+        </p:spPr>
+        <p:txBody>
+          <a:bodyPr wrap="square" rtlCol="0">
+            <a:spAutoFit/>
+          </a:bodyPr>
+          <a:lstStyle/>
+          <a:p>
+            <a:pPr algn="just"/>
+            <a:r>
+              <a:rPr lang="es-ES" sz="2000" b="1" i="1" dirty="0">
+                <a:solidFill>
+                  <a:schemeClr val="accent4">
+                    <a:lumMod val="75000"/>
+                  </a:schemeClr>
+                </a:solidFill>
+                <a:latin typeface="+mj-lt"/>
+              </a:rPr>
+              <a:t>Anemonia </a:t>
+            </a:r>
+            <a:r>
+              <a:rPr lang="es-ES" sz="2000" b="1" i="1" dirty="0" err="1">
+                <a:solidFill>
+                  <a:schemeClr val="accent4">
+                    <a:lumMod val="75000"/>
+                  </a:schemeClr>
+                </a:solidFill>
+                <a:latin typeface="+mj-lt"/>
+              </a:rPr>
+              <a:t>sulcata</a:t>
+            </a:r>
+            <a:r>
+              <a:rPr lang="es-ES" sz="2000" b="1" i="1" dirty="0">
+                <a:solidFill>
+                  <a:schemeClr val="accent4">
+                    <a:lumMod val="75000"/>
+                  </a:schemeClr>
+                </a:solidFill>
+                <a:latin typeface="+mj-lt"/>
+              </a:rPr>
+              <a:t> </a:t>
+            </a:r>
+            <a:r>
+              <a:rPr lang="es-ES" dirty="0"/>
+              <a:t>es un antozoo ampliamente distribuido por el mar mediterráneo, presenta tanto reproducción sexual como asexual. </a:t>
+            </a:r>
+            <a:r>
+              <a:rPr lang="es-ES" sz="1800" dirty="0"/>
+              <a:t>En los últimos años, la explotación sobre sus poblaciones en Andalucía se ha incrementado considerablemente como consecuencia de una mayor demanda y recolección furtiva, lo que ha deteriorado su estado de conservación localmente.</a:t>
+            </a:r>
+          </a:p>
+          <a:p>
+            <a:endParaRPr lang="es-ES" dirty="0"/>
+          </a:p>
+        </p:txBody>
+      </p:sp>
       <p:grpSp>
         <p:nvGrpSpPr>
-          <p:cNvPr id="67" name="Grupo 66">
+          <p:cNvPr id="66" name="Grupo 65">
             <a:extLst>
               <a:ext uri="{FF2B5EF4-FFF2-40B4-BE49-F238E27FC236}">
-                <a16:creationId xmlns:a16="http://schemas.microsoft.com/office/drawing/2014/main" id="{5007EE78-47DD-0ADD-3C3A-02F818DF1895}"/>
+                <a16:creationId xmlns:a16="http://schemas.microsoft.com/office/drawing/2014/main" id="{FF27DD8D-70F7-AAC2-61CF-55D4025FE99E}"/>
               </a:ext>
             </a:extLst>
           </p:cNvPr>
@@ -4460,164 +4681,56 @@
         </p:nvGrpSpPr>
         <p:grpSpPr>
           <a:xfrm>
-            <a:off x="712425" y="4810141"/>
-            <a:ext cx="19534400" cy="5209230"/>
-            <a:chOff x="712425" y="4810141"/>
-            <a:chExt cx="19534400" cy="5209230"/>
+            <a:off x="6838570" y="8680941"/>
+            <a:ext cx="4903872" cy="3677904"/>
+            <a:chOff x="21398496" y="2456246"/>
+            <a:chExt cx="4903872" cy="3677904"/>
           </a:xfrm>
         </p:grpSpPr>
-        <p:sp>
-          <p:nvSpPr>
-            <p:cNvPr id="4" name="Rectángulo: esquinas redondeadas 3">
+        <p:pic>
+          <p:nvPicPr>
+            <p:cNvPr id="15" name="Imagen 14">
               <a:extLst>
                 <a:ext uri="{FF2B5EF4-FFF2-40B4-BE49-F238E27FC236}">
-                  <a16:creationId xmlns:a16="http://schemas.microsoft.com/office/drawing/2014/main" id="{A673775D-BC9E-1292-FFF4-A0D0B80D4A6A}"/>
+                  <a16:creationId xmlns:a16="http://schemas.microsoft.com/office/drawing/2014/main" id="{E93B7A50-7D32-EDB7-13D0-43B8B32FED6E}"/>
                 </a:ext>
               </a:extLst>
             </p:cNvPr>
-            <p:cNvSpPr/>
+            <p:cNvPicPr>
+              <a:picLocks noChangeAspect="1"/>
+            </p:cNvPicPr>
             <p:nvPr/>
-          </p:nvSpPr>
+          </p:nvPicPr>
+          <p:blipFill>
+            <a:blip r:embed="rId2" cstate="print">
+              <a:extLst>
+                <a:ext uri="{28A0092B-C50C-407E-A947-70E740481C1C}">
+                  <a14:useLocalDpi xmlns:a14="http://schemas.microsoft.com/office/drawing/2010/main" val="0"/>
+                </a:ext>
+              </a:extLst>
+            </a:blip>
+            <a:stretch>
+              <a:fillRect/>
+            </a:stretch>
+          </p:blipFill>
           <p:spPr>
             <a:xfrm>
-              <a:off x="712425" y="5060710"/>
-              <a:ext cx="19466619" cy="4958661"/>
+              <a:off x="21398496" y="2456246"/>
+              <a:ext cx="4903872" cy="3677904"/>
             </a:xfrm>
             <a:prstGeom prst="roundRect">
               <a:avLst>
-                <a:gd name="adj" fmla="val 1492"/>
+                <a:gd name="adj" fmla="val 6451"/>
               </a:avLst>
             </a:prstGeom>
-            <a:gradFill flip="none" rotWithShape="1">
-              <a:gsLst>
-                <a:gs pos="0">
-                  <a:schemeClr val="bg1">
-                    <a:lumMod val="95000"/>
-                    <a:shade val="30000"/>
-                    <a:satMod val="115000"/>
-                  </a:schemeClr>
-                </a:gs>
-                <a:gs pos="0">
-                  <a:schemeClr val="bg1">
-                    <a:lumMod val="95000"/>
-                    <a:shade val="67500"/>
-                    <a:satMod val="115000"/>
-                    <a:alpha val="80000"/>
-                  </a:schemeClr>
-                </a:gs>
-                <a:gs pos="47000">
-                  <a:schemeClr val="bg1">
-                    <a:lumMod val="95000"/>
-                    <a:shade val="100000"/>
-                    <a:satMod val="115000"/>
-                  </a:schemeClr>
-                </a:gs>
-              </a:gsLst>
-              <a:lin ang="13500000" scaled="1"/>
-              <a:tileRect/>
-            </a:gradFill>
-            <a:ln>
-              <a:noFill/>
-            </a:ln>
           </p:spPr>
-          <p:style>
-            <a:lnRef idx="2">
-              <a:schemeClr val="accent1">
-                <a:shade val="50000"/>
-              </a:schemeClr>
-            </a:lnRef>
-            <a:fillRef idx="1">
-              <a:schemeClr val="accent1"/>
-            </a:fillRef>
-            <a:effectRef idx="0">
-              <a:schemeClr val="accent1"/>
-            </a:effectRef>
-            <a:fontRef idx="minor">
-              <a:schemeClr val="lt1"/>
-            </a:fontRef>
-          </p:style>
-          <p:txBody>
-            <a:bodyPr rtlCol="0" anchor="ctr"/>
-            <a:lstStyle/>
-            <a:p>
-              <a:pPr algn="ctr"/>
-              <a:endParaRPr lang="es-ES" dirty="0"/>
-            </a:p>
-          </p:txBody>
-        </p:sp>
+        </p:pic>
         <p:sp>
           <p:nvSpPr>
-            <p:cNvPr id="5" name="Rectángulo: esquinas redondeadas 4">
+            <p:cNvPr id="43" name="CuadroTexto 42">
               <a:extLst>
                 <a:ext uri="{FF2B5EF4-FFF2-40B4-BE49-F238E27FC236}">
-                  <a16:creationId xmlns:a16="http://schemas.microsoft.com/office/drawing/2014/main" id="{8A818B2A-457B-91EC-5170-D9BFBB54CD6B}"/>
-                </a:ext>
-              </a:extLst>
-            </p:cNvPr>
-            <p:cNvSpPr/>
-            <p:nvPr/>
-          </p:nvSpPr>
-          <p:spPr>
-            <a:xfrm>
-              <a:off x="712426" y="4810141"/>
-              <a:ext cx="19534399" cy="624704"/>
-            </a:xfrm>
-            <a:prstGeom prst="roundRect">
-              <a:avLst/>
-            </a:prstGeom>
-            <a:gradFill flip="none" rotWithShape="1">
-              <a:gsLst>
-                <a:gs pos="95000">
-                  <a:schemeClr val="accent3"/>
-                </a:gs>
-                <a:gs pos="5000">
-                  <a:schemeClr val="accent4">
-                    <a:lumMod val="60000"/>
-                    <a:lumOff val="40000"/>
-                  </a:schemeClr>
-                </a:gs>
-                <a:gs pos="46000">
-                  <a:schemeClr val="accent4"/>
-                </a:gs>
-              </a:gsLst>
-              <a:lin ang="2700000" scaled="1"/>
-              <a:tileRect/>
-            </a:gradFill>
-            <a:ln>
-              <a:noFill/>
-            </a:ln>
-          </p:spPr>
-          <p:style>
-            <a:lnRef idx="2">
-              <a:schemeClr val="accent1">
-                <a:shade val="50000"/>
-              </a:schemeClr>
-            </a:lnRef>
-            <a:fillRef idx="1">
-              <a:schemeClr val="accent1"/>
-            </a:fillRef>
-            <a:effectRef idx="0">
-              <a:schemeClr val="accent1"/>
-            </a:effectRef>
-            <a:fontRef idx="minor">
-              <a:schemeClr val="lt1"/>
-            </a:fontRef>
-          </p:style>
-          <p:txBody>
-            <a:bodyPr rtlCol="0" anchor="ctr"/>
-            <a:lstStyle/>
-            <a:p>
-              <a:pPr algn="ctr"/>
-              <a:endParaRPr lang="es-ES"/>
-            </a:p>
-          </p:txBody>
-        </p:sp>
-        <p:sp>
-          <p:nvSpPr>
-            <p:cNvPr id="6" name="CuadroTexto 5">
-              <a:extLst>
-                <a:ext uri="{FF2B5EF4-FFF2-40B4-BE49-F238E27FC236}">
-                  <a16:creationId xmlns:a16="http://schemas.microsoft.com/office/drawing/2014/main" id="{771F5443-2AC0-6464-23E7-CB153FAF3CDD}"/>
+                  <a16:creationId xmlns:a16="http://schemas.microsoft.com/office/drawing/2014/main" id="{DB4CDEE4-84E1-1AD7-EB1A-619823EB1D3E}"/>
                 </a:ext>
               </a:extLst>
             </p:cNvPr>
@@ -4626,8 +4739,8 @@
           </p:nvSpPr>
           <p:spPr>
             <a:xfrm>
-              <a:off x="897810" y="4860655"/>
-              <a:ext cx="8288712" cy="400110"/>
+              <a:off x="24740716" y="2569944"/>
+              <a:ext cx="1561652" cy="584775"/>
             </a:xfrm>
             <a:prstGeom prst="rect">
               <a:avLst/>
@@ -4641,177 +4754,24 @@
             <a:lstStyle/>
             <a:p>
               <a:r>
-                <a:rPr lang="es-ES" sz="2000" b="1" dirty="0">
-                  <a:solidFill>
-                    <a:schemeClr val="bg1"/>
-                  </a:solidFill>
-                  <a:latin typeface="Cooper Hewitt Semibold" pitchFamily="2" charset="0"/>
-                  <a:ea typeface="Cooper Hewitt Semibold" pitchFamily="2" charset="0"/>
+                <a:rPr lang="es-ES" sz="800" dirty="0">
+                  <a:latin typeface="Cooper Hewitt Medium" pitchFamily="2" charset="0"/>
+                  <a:ea typeface="Cooper Hewitt Medium" pitchFamily="2" charset="0"/>
                 </a:rPr>
-                <a:t>INTRODUCCIÓN</a:t>
+                <a:t>POM: Materia orgánica particulada</a:t>
               </a:r>
-              <a:endParaRPr lang="x-none" sz="2000" b="1" dirty="0">
-                <a:solidFill>
-                  <a:schemeClr val="bg1"/>
-                </a:solidFill>
-                <a:latin typeface="Cooper Hewitt Semibold" pitchFamily="2" charset="0"/>
-                <a:ea typeface="Cooper Hewitt Semibold" pitchFamily="2" charset="0"/>
-              </a:endParaRPr>
-            </a:p>
-          </p:txBody>
-        </p:sp>
-        <p:sp>
-          <p:nvSpPr>
-            <p:cNvPr id="8" name="CuadroTexto 7">
-              <a:extLst>
-                <a:ext uri="{FF2B5EF4-FFF2-40B4-BE49-F238E27FC236}">
-                  <a16:creationId xmlns:a16="http://schemas.microsoft.com/office/drawing/2014/main" id="{023818B1-24F6-1BDF-9235-7B639963B35B}"/>
-                </a:ext>
-              </a:extLst>
-            </p:cNvPr>
-            <p:cNvSpPr txBox="1"/>
-            <p:nvPr/>
-          </p:nvSpPr>
-          <p:spPr>
-            <a:xfrm>
-              <a:off x="897810" y="6068854"/>
-              <a:ext cx="3208868" cy="738664"/>
-            </a:xfrm>
-            <a:prstGeom prst="rect">
-              <a:avLst/>
-            </a:prstGeom>
-            <a:noFill/>
-          </p:spPr>
-          <p:txBody>
-            <a:bodyPr wrap="square" rtlCol="0">
-              <a:spAutoFit/>
-            </a:bodyPr>
-            <a:lstStyle/>
-            <a:p>
-              <a:r>
-                <a:rPr lang="es-ES" sz="2400" b="1" dirty="0">
-                  <a:latin typeface="+mj-lt"/>
-                </a:rPr>
-                <a:t>Título de ejemplo</a:t>
-              </a:r>
-              <a:endParaRPr lang="es-ES" dirty="0">
-                <a:latin typeface="+mj-lt"/>
-              </a:endParaRPr>
             </a:p>
             <a:p>
               <a:r>
-                <a:rPr lang="es-ES" dirty="0"/>
-                <a:t>Cuerpo de ejemplo</a:t>
+                <a:rPr lang="es-ES" sz="800" dirty="0">
+                  <a:latin typeface="Cooper Hewitt Medium" pitchFamily="2" charset="0"/>
+                  <a:ea typeface="Cooper Hewitt Medium" pitchFamily="2" charset="0"/>
+                </a:rPr>
+                <a:t>DIN: Nutrientes inorgánicos disueltos</a:t>
               </a:r>
             </a:p>
           </p:txBody>
         </p:sp>
-        <p:grpSp>
-          <p:nvGrpSpPr>
-            <p:cNvPr id="66" name="Grupo 65">
-              <a:extLst>
-                <a:ext uri="{FF2B5EF4-FFF2-40B4-BE49-F238E27FC236}">
-                  <a16:creationId xmlns:a16="http://schemas.microsoft.com/office/drawing/2014/main" id="{FF27DD8D-70F7-AAC2-61CF-55D4025FE99E}"/>
-                </a:ext>
-              </a:extLst>
-            </p:cNvPr>
-            <p:cNvGrpSpPr/>
-            <p:nvPr/>
-          </p:nvGrpSpPr>
-          <p:grpSpPr>
-            <a:xfrm>
-              <a:off x="4370260" y="5480828"/>
-              <a:ext cx="5878884" cy="4409163"/>
-              <a:chOff x="4370260" y="5480828"/>
-              <a:chExt cx="5878884" cy="4409163"/>
-            </a:xfrm>
-          </p:grpSpPr>
-          <p:pic>
-            <p:nvPicPr>
-              <p:cNvPr id="15" name="Imagen 14">
-                <a:extLst>
-                  <a:ext uri="{FF2B5EF4-FFF2-40B4-BE49-F238E27FC236}">
-                    <a16:creationId xmlns:a16="http://schemas.microsoft.com/office/drawing/2014/main" id="{E93B7A50-7D32-EDB7-13D0-43B8B32FED6E}"/>
-                  </a:ext>
-                </a:extLst>
-              </p:cNvPr>
-              <p:cNvPicPr>
-                <a:picLocks noChangeAspect="1"/>
-              </p:cNvPicPr>
-              <p:nvPr/>
-            </p:nvPicPr>
-            <p:blipFill>
-              <a:blip r:embed="rId2" cstate="print">
-                <a:extLst>
-                  <a:ext uri="{28A0092B-C50C-407E-A947-70E740481C1C}">
-                    <a14:useLocalDpi xmlns:a14="http://schemas.microsoft.com/office/drawing/2010/main" val="0"/>
-                  </a:ext>
-                </a:extLst>
-              </a:blip>
-              <a:stretch>
-                <a:fillRect/>
-              </a:stretch>
-            </p:blipFill>
-            <p:spPr>
-              <a:xfrm>
-                <a:off x="4370260" y="5480828"/>
-                <a:ext cx="5878884" cy="4409163"/>
-              </a:xfrm>
-              <a:prstGeom prst="roundRect">
-                <a:avLst>
-                  <a:gd name="adj" fmla="val 6451"/>
-                </a:avLst>
-              </a:prstGeom>
-            </p:spPr>
-          </p:pic>
-          <p:sp>
-            <p:nvSpPr>
-              <p:cNvPr id="43" name="CuadroTexto 42">
-                <a:extLst>
-                  <a:ext uri="{FF2B5EF4-FFF2-40B4-BE49-F238E27FC236}">
-                    <a16:creationId xmlns:a16="http://schemas.microsoft.com/office/drawing/2014/main" id="{DB4CDEE4-84E1-1AD7-EB1A-619823EB1D3E}"/>
-                  </a:ext>
-                </a:extLst>
-              </p:cNvPr>
-              <p:cNvSpPr txBox="1"/>
-              <p:nvPr/>
-            </p:nvSpPr>
-            <p:spPr>
-              <a:xfrm>
-                <a:off x="8358639" y="5623615"/>
-                <a:ext cx="1872147" cy="338554"/>
-              </a:xfrm>
-              <a:prstGeom prst="rect">
-                <a:avLst/>
-              </a:prstGeom>
-              <a:noFill/>
-            </p:spPr>
-            <p:txBody>
-              <a:bodyPr wrap="square" rtlCol="0">
-                <a:spAutoFit/>
-              </a:bodyPr>
-              <a:lstStyle/>
-              <a:p>
-                <a:r>
-                  <a:rPr lang="es-ES" sz="800" dirty="0">
-                    <a:latin typeface="Cooper Hewitt Medium" pitchFamily="2" charset="0"/>
-                    <a:ea typeface="Cooper Hewitt Medium" pitchFamily="2" charset="0"/>
-                  </a:rPr>
-                  <a:t>POM: Materia orgánica particulada</a:t>
-                </a:r>
-              </a:p>
-              <a:p>
-                <a:r>
-                  <a:rPr lang="es-ES" sz="800" dirty="0">
-                    <a:latin typeface="Cooper Hewitt Medium" pitchFamily="2" charset="0"/>
-                    <a:ea typeface="Cooper Hewitt Medium" pitchFamily="2" charset="0"/>
-                  </a:rPr>
-                  <a:t>DIN: Nutrientes inorgánicos disueltos</a:t>
-                </a:r>
-              </a:p>
-            </p:txBody>
-          </p:sp>
-        </p:grpSp>
       </p:grpSp>
       <p:sp>
         <p:nvSpPr>
@@ -4827,8 +4787,8 @@
         </p:nvSpPr>
         <p:spPr>
           <a:xfrm>
-            <a:off x="1230392" y="1000966"/>
-            <a:ext cx="18126077" cy="3139321"/>
+            <a:off x="712425" y="1074913"/>
+            <a:ext cx="20408628" cy="2123658"/>
           </a:xfrm>
           <a:prstGeom prst="rect">
             <a:avLst/>
@@ -4841,7 +4801,6 @@
           </a:bodyPr>
           <a:lstStyle/>
           <a:p>
-            <a:pPr algn="ctr"/>
             <a:r>
               <a:rPr lang="es-ES" sz="6600" dirty="0">
                 <a:latin typeface="Bahnschrift SemiBold SemiConden" panose="020B0502040204020203" pitchFamily="34" charset="0"/>
@@ -4903,7 +4862,7 @@
         </p:blipFill>
         <p:spPr>
           <a:xfrm>
-            <a:off x="10318968" y="17507768"/>
+            <a:off x="11217799" y="16983742"/>
             <a:ext cx="8572789" cy="4572154"/>
           </a:xfrm>
           <a:prstGeom prst="rect">
@@ -4939,7 +4898,7 @@
         </p:blipFill>
         <p:spPr>
           <a:xfrm>
-            <a:off x="3023307" y="27546846"/>
+            <a:off x="-8975575" y="19899286"/>
             <a:ext cx="8572789" cy="4572154"/>
           </a:xfrm>
           <a:prstGeom prst="rect">
@@ -4975,7 +4934,7 @@
         </p:blipFill>
         <p:spPr>
           <a:xfrm>
-            <a:off x="1238322" y="22508308"/>
+            <a:off x="1138207" y="21608980"/>
             <a:ext cx="8572789" cy="4572154"/>
           </a:xfrm>
           <a:prstGeom prst="rect">
@@ -5011,7 +4970,7 @@
         </p:blipFill>
         <p:spPr>
           <a:xfrm>
-            <a:off x="1229303" y="17469770"/>
+            <a:off x="1145806" y="17015477"/>
             <a:ext cx="8572789" cy="4572154"/>
           </a:xfrm>
           <a:prstGeom prst="rect">
@@ -5047,7 +5006,7 @@
         </p:blipFill>
         <p:spPr>
           <a:xfrm>
-            <a:off x="10445734" y="22475142"/>
+            <a:off x="11065062" y="21909351"/>
             <a:ext cx="8572789" cy="4572154"/>
           </a:xfrm>
           <a:prstGeom prst="rect">
@@ -5055,6 +5014,709 @@
           </a:prstGeom>
         </p:spPr>
       </p:pic>
+      <p:sp>
+        <p:nvSpPr>
+          <p:cNvPr id="49" name="CuadroTexto 48">
+            <a:extLst>
+              <a:ext uri="{FF2B5EF4-FFF2-40B4-BE49-F238E27FC236}">
+                <a16:creationId xmlns:a16="http://schemas.microsoft.com/office/drawing/2014/main" id="{8BAF9DC3-5895-2396-1ADF-503AFE4A0D7D}"/>
+              </a:ext>
+            </a:extLst>
+          </p:cNvPr>
+          <p:cNvSpPr txBox="1"/>
+          <p:nvPr/>
+        </p:nvSpPr>
+        <p:spPr>
+          <a:xfrm>
+            <a:off x="6051499" y="7580727"/>
+            <a:ext cx="6844673" cy="923330"/>
+          </a:xfrm>
+          <a:prstGeom prst="rect">
+            <a:avLst/>
+          </a:prstGeom>
+          <a:noFill/>
+        </p:spPr>
+        <p:txBody>
+          <a:bodyPr wrap="square">
+            <a:spAutoFit/>
+          </a:bodyPr>
+          <a:lstStyle/>
+          <a:p>
+            <a:pPr algn="just"/>
+            <a:r>
+              <a:rPr lang="es-ES" sz="1800" dirty="0"/>
+              <a:t>La acuicultura ofrece una posible solución a ese problema de conservación, especialmente a través de la </a:t>
+            </a:r>
+            <a:r>
+              <a:rPr lang="es-ES" sz="1800" b="1" dirty="0">
+                <a:solidFill>
+                  <a:srgbClr val="47A5A3"/>
+                </a:solidFill>
+              </a:rPr>
+              <a:t>acuicultura multitrófica integrada (IMTA). </a:t>
+            </a:r>
+          </a:p>
+        </p:txBody>
+      </p:sp>
+      <p:pic>
+        <p:nvPicPr>
+          <p:cNvPr id="50" name="Picture 4" descr="Anemonia viridis">
+            <a:extLst>
+              <a:ext uri="{FF2B5EF4-FFF2-40B4-BE49-F238E27FC236}">
+                <a16:creationId xmlns:a16="http://schemas.microsoft.com/office/drawing/2014/main" id="{ACCDF8C5-D795-422B-C4C1-EAFA65D2BA72}"/>
+              </a:ext>
+            </a:extLst>
+          </p:cNvPr>
+          <p:cNvPicPr>
+            <a:picLocks noChangeAspect="1" noChangeArrowheads="1"/>
+          </p:cNvPicPr>
+          <p:nvPr/>
+        </p:nvPicPr>
+        <p:blipFill>
+          <a:blip r:embed="rId8" cstate="print">
+            <a:extLst>
+              <a:ext uri="{28A0092B-C50C-407E-A947-70E740481C1C}">
+                <a14:useLocalDpi xmlns:a14="http://schemas.microsoft.com/office/drawing/2010/main" val="0"/>
+              </a:ext>
+            </a:extLst>
+          </a:blip>
+          <a:srcRect/>
+          <a:stretch>
+            <a:fillRect/>
+          </a:stretch>
+        </p:blipFill>
+        <p:spPr bwMode="auto">
+          <a:xfrm>
+            <a:off x="1229303" y="5820265"/>
+            <a:ext cx="4202898" cy="3427168"/>
+          </a:xfrm>
+          <a:prstGeom prst="rect">
+            <a:avLst/>
+          </a:prstGeom>
+          <a:noFill/>
+          <a:extLst>
+            <a:ext uri="{909E8E84-426E-40DD-AFC4-6F175D3DCCD1}">
+              <a14:hiddenFill xmlns:a14="http://schemas.microsoft.com/office/drawing/2010/main">
+                <a:solidFill>
+                  <a:srgbClr val="FFFFFF"/>
+                </a:solidFill>
+              </a14:hiddenFill>
+            </a:ext>
+          </a:extLst>
+        </p:spPr>
+      </p:pic>
+      <p:grpSp>
+        <p:nvGrpSpPr>
+          <p:cNvPr id="69" name="Grupo 68">
+            <a:extLst>
+              <a:ext uri="{FF2B5EF4-FFF2-40B4-BE49-F238E27FC236}">
+                <a16:creationId xmlns:a16="http://schemas.microsoft.com/office/drawing/2014/main" id="{248882A6-A87C-E245-31B0-C27EA88AD0DD}"/>
+              </a:ext>
+            </a:extLst>
+          </p:cNvPr>
+          <p:cNvGrpSpPr/>
+          <p:nvPr/>
+        </p:nvGrpSpPr>
+        <p:grpSpPr>
+          <a:xfrm>
+            <a:off x="1495978" y="9803928"/>
+            <a:ext cx="4641467" cy="2147909"/>
+            <a:chOff x="5079041" y="11088636"/>
+            <a:chExt cx="4323861" cy="2147909"/>
+          </a:xfrm>
+        </p:grpSpPr>
+        <p:sp>
+          <p:nvSpPr>
+            <p:cNvPr id="70" name="CuadroTexto 69">
+              <a:extLst>
+                <a:ext uri="{FF2B5EF4-FFF2-40B4-BE49-F238E27FC236}">
+                  <a16:creationId xmlns:a16="http://schemas.microsoft.com/office/drawing/2014/main" id="{837EE1B4-0C7B-8878-2A8E-77FB0D2878C1}"/>
+                </a:ext>
+              </a:extLst>
+            </p:cNvPr>
+            <p:cNvSpPr txBox="1"/>
+            <p:nvPr/>
+          </p:nvSpPr>
+          <p:spPr>
+            <a:xfrm>
+              <a:off x="5300198" y="11420279"/>
+              <a:ext cx="4102704" cy="1816266"/>
+            </a:xfrm>
+            <a:prstGeom prst="rect">
+              <a:avLst/>
+            </a:prstGeom>
+            <a:noFill/>
+          </p:spPr>
+          <p:txBody>
+            <a:bodyPr wrap="square" rtlCol="0">
+              <a:spAutoFit/>
+            </a:bodyPr>
+            <a:lstStyle/>
+            <a:p>
+              <a:pPr algn="just"/>
+              <a:r>
+                <a:rPr lang="es-ES" dirty="0"/>
+                <a:t>En estos sistemas, se cultiva la especie principal junto a distintas especies extractivas, de diferente nivel trófico. Se genera así un ciclo de nutrientes en el sistema de cultivo, contribuyendo a la sostenibilidad de la explotación acuícola.</a:t>
+              </a:r>
+              <a:endParaRPr lang="x-none" dirty="0"/>
+            </a:p>
+          </p:txBody>
+        </p:sp>
+        <p:grpSp>
+          <p:nvGrpSpPr>
+            <p:cNvPr id="71" name="Grupo 70">
+              <a:extLst>
+                <a:ext uri="{FF2B5EF4-FFF2-40B4-BE49-F238E27FC236}">
+                  <a16:creationId xmlns:a16="http://schemas.microsoft.com/office/drawing/2014/main" id="{0D4ED7B2-A292-F739-5370-034F9B9FF246}"/>
+                </a:ext>
+              </a:extLst>
+            </p:cNvPr>
+            <p:cNvGrpSpPr/>
+            <p:nvPr/>
+          </p:nvGrpSpPr>
+          <p:grpSpPr>
+            <a:xfrm>
+              <a:off x="5079041" y="11088636"/>
+              <a:ext cx="2699902" cy="2106312"/>
+              <a:chOff x="5079041" y="11088636"/>
+              <a:chExt cx="2699902" cy="2106312"/>
+            </a:xfrm>
+          </p:grpSpPr>
+          <p:grpSp>
+            <p:nvGrpSpPr>
+              <p:cNvPr id="72" name="Grupo 71">
+                <a:extLst>
+                  <a:ext uri="{FF2B5EF4-FFF2-40B4-BE49-F238E27FC236}">
+                    <a16:creationId xmlns:a16="http://schemas.microsoft.com/office/drawing/2014/main" id="{DAB4CE63-4DE7-A843-BBFA-E205E6B8875E}"/>
+                  </a:ext>
+                </a:extLst>
+              </p:cNvPr>
+              <p:cNvGrpSpPr/>
+              <p:nvPr/>
+            </p:nvGrpSpPr>
+            <p:grpSpPr>
+              <a:xfrm>
+                <a:off x="5079041" y="11295487"/>
+                <a:ext cx="402967" cy="1899461"/>
+                <a:chOff x="5095410" y="11976592"/>
+                <a:chExt cx="402967" cy="1899461"/>
+              </a:xfrm>
+            </p:grpSpPr>
+            <p:grpSp>
+              <p:nvGrpSpPr>
+                <p:cNvPr id="74" name="Grupo 73">
+                  <a:extLst>
+                    <a:ext uri="{FF2B5EF4-FFF2-40B4-BE49-F238E27FC236}">
+                      <a16:creationId xmlns:a16="http://schemas.microsoft.com/office/drawing/2014/main" id="{8883E14F-62D3-4C5C-58C4-67DB05AC060A}"/>
+                    </a:ext>
+                  </a:extLst>
+                </p:cNvPr>
+                <p:cNvGrpSpPr/>
+                <p:nvPr/>
+              </p:nvGrpSpPr>
+              <p:grpSpPr>
+                <a:xfrm>
+                  <a:off x="5178337" y="11976592"/>
+                  <a:ext cx="320040" cy="1899461"/>
+                  <a:chOff x="5721876" y="10549467"/>
+                  <a:chExt cx="320040" cy="1524000"/>
+                </a:xfrm>
+                <a:solidFill>
+                  <a:srgbClr val="FFBC42"/>
+                </a:solidFill>
+              </p:grpSpPr>
+              <p:cxnSp>
+                <p:nvCxnSpPr>
+                  <p:cNvPr id="76" name="Conector recto 75">
+                    <a:extLst>
+                      <a:ext uri="{FF2B5EF4-FFF2-40B4-BE49-F238E27FC236}">
+                        <a16:creationId xmlns:a16="http://schemas.microsoft.com/office/drawing/2014/main" id="{6485FFFE-FDCF-DE19-BC3F-795AF9A0B3A9}"/>
+                      </a:ext>
+                    </a:extLst>
+                  </p:cNvPr>
+                  <p:cNvCxnSpPr/>
+                  <p:nvPr/>
+                </p:nvCxnSpPr>
+                <p:spPr>
+                  <a:xfrm>
+                    <a:off x="5740400" y="10549467"/>
+                    <a:ext cx="0" cy="1524000"/>
+                  </a:xfrm>
+                  <a:prstGeom prst="line">
+                    <a:avLst/>
+                  </a:prstGeom>
+                  <a:grpFill/>
+                  <a:ln w="57150">
+                    <a:solidFill>
+                      <a:srgbClr val="FFBC42"/>
+                    </a:solidFill>
+                  </a:ln>
+                </p:spPr>
+                <p:style>
+                  <a:lnRef idx="1">
+                    <a:schemeClr val="accent1"/>
+                  </a:lnRef>
+                  <a:fillRef idx="0">
+                    <a:schemeClr val="accent1"/>
+                  </a:fillRef>
+                  <a:effectRef idx="0">
+                    <a:schemeClr val="accent1"/>
+                  </a:effectRef>
+                  <a:fontRef idx="minor">
+                    <a:schemeClr val="tx1"/>
+                  </a:fontRef>
+                </p:style>
+              </p:cxnSp>
+              <p:cxnSp>
+                <p:nvCxnSpPr>
+                  <p:cNvPr id="77" name="Conector recto 76">
+                    <a:extLst>
+                      <a:ext uri="{FF2B5EF4-FFF2-40B4-BE49-F238E27FC236}">
+                        <a16:creationId xmlns:a16="http://schemas.microsoft.com/office/drawing/2014/main" id="{CE0D7952-EC67-1747-2797-55AE0587DA76}"/>
+                      </a:ext>
+                    </a:extLst>
+                  </p:cNvPr>
+                  <p:cNvCxnSpPr>
+                    <a:cxnSpLocks/>
+                  </p:cNvCxnSpPr>
+                  <p:nvPr/>
+                </p:nvCxnSpPr>
+                <p:spPr>
+                  <a:xfrm>
+                    <a:off x="5721876" y="10561695"/>
+                    <a:ext cx="320040" cy="0"/>
+                  </a:xfrm>
+                  <a:prstGeom prst="line">
+                    <a:avLst/>
+                  </a:prstGeom>
+                  <a:grpFill/>
+                  <a:ln w="57150">
+                    <a:solidFill>
+                      <a:srgbClr val="FFBC42"/>
+                    </a:solidFill>
+                  </a:ln>
+                </p:spPr>
+                <p:style>
+                  <a:lnRef idx="1">
+                    <a:schemeClr val="accent1"/>
+                  </a:lnRef>
+                  <a:fillRef idx="0">
+                    <a:schemeClr val="accent1"/>
+                  </a:fillRef>
+                  <a:effectRef idx="0">
+                    <a:schemeClr val="accent1"/>
+                  </a:effectRef>
+                  <a:fontRef idx="minor">
+                    <a:schemeClr val="tx1"/>
+                  </a:fontRef>
+                </p:style>
+              </p:cxnSp>
+              <p:cxnSp>
+                <p:nvCxnSpPr>
+                  <p:cNvPr id="78" name="Conector recto 77">
+                    <a:extLst>
+                      <a:ext uri="{FF2B5EF4-FFF2-40B4-BE49-F238E27FC236}">
+                        <a16:creationId xmlns:a16="http://schemas.microsoft.com/office/drawing/2014/main" id="{19A6E3C7-4AD7-BF80-42D9-AADE9F6FBD8F}"/>
+                      </a:ext>
+                    </a:extLst>
+                  </p:cNvPr>
+                  <p:cNvCxnSpPr>
+                    <a:cxnSpLocks/>
+                  </p:cNvCxnSpPr>
+                  <p:nvPr/>
+                </p:nvCxnSpPr>
+                <p:spPr>
+                  <a:xfrm>
+                    <a:off x="5721876" y="12065315"/>
+                    <a:ext cx="101719" cy="0"/>
+                  </a:xfrm>
+                  <a:prstGeom prst="line">
+                    <a:avLst/>
+                  </a:prstGeom>
+                  <a:grpFill/>
+                  <a:ln w="57150">
+                    <a:solidFill>
+                      <a:srgbClr val="FFBC42"/>
+                    </a:solidFill>
+                  </a:ln>
+                </p:spPr>
+                <p:style>
+                  <a:lnRef idx="1">
+                    <a:schemeClr val="accent1"/>
+                  </a:lnRef>
+                  <a:fillRef idx="0">
+                    <a:schemeClr val="accent1"/>
+                  </a:fillRef>
+                  <a:effectRef idx="0">
+                    <a:schemeClr val="accent1"/>
+                  </a:effectRef>
+                  <a:fontRef idx="minor">
+                    <a:schemeClr val="tx1"/>
+                  </a:fontRef>
+                </p:style>
+              </p:cxnSp>
+            </p:grpSp>
+            <p:sp>
+              <p:nvSpPr>
+                <p:cNvPr id="75" name="Elipse 74">
+                  <a:extLst>
+                    <a:ext uri="{FF2B5EF4-FFF2-40B4-BE49-F238E27FC236}">
+                      <a16:creationId xmlns:a16="http://schemas.microsoft.com/office/drawing/2014/main" id="{C732E7F4-53C9-2C34-AC0A-18B0C8CF9C8C}"/>
+                    </a:ext>
+                  </a:extLst>
+                </p:cNvPr>
+                <p:cNvSpPr/>
+                <p:nvPr/>
+              </p:nvSpPr>
+              <p:spPr>
+                <a:xfrm>
+                  <a:off x="5095410" y="12826759"/>
+                  <a:ext cx="202901" cy="202901"/>
+                </a:xfrm>
+                <a:prstGeom prst="ellipse">
+                  <a:avLst/>
+                </a:prstGeom>
+                <a:solidFill>
+                  <a:srgbClr val="FFBC42"/>
+                </a:solidFill>
+                <a:ln>
+                  <a:solidFill>
+                    <a:srgbClr val="FFBC42"/>
+                  </a:solidFill>
+                </a:ln>
+              </p:spPr>
+              <p:style>
+                <a:lnRef idx="2">
+                  <a:schemeClr val="accent1">
+                    <a:shade val="50000"/>
+                  </a:schemeClr>
+                </a:lnRef>
+                <a:fillRef idx="1">
+                  <a:schemeClr val="accent1"/>
+                </a:fillRef>
+                <a:effectRef idx="0">
+                  <a:schemeClr val="accent1"/>
+                </a:effectRef>
+                <a:fontRef idx="minor">
+                  <a:schemeClr val="lt1"/>
+                </a:fontRef>
+              </p:style>
+              <p:txBody>
+                <a:bodyPr rtlCol="0" anchor="ctr"/>
+                <a:lstStyle/>
+                <a:p>
+                  <a:pPr algn="ctr"/>
+                  <a:endParaRPr lang="es-ES"/>
+                </a:p>
+              </p:txBody>
+            </p:sp>
+          </p:grpSp>
+          <p:sp>
+            <p:nvSpPr>
+              <p:cNvPr id="73" name="CuadroTexto 72">
+                <a:extLst>
+                  <a:ext uri="{FF2B5EF4-FFF2-40B4-BE49-F238E27FC236}">
+                    <a16:creationId xmlns:a16="http://schemas.microsoft.com/office/drawing/2014/main" id="{1B9DD0C9-D28B-8A38-CE2F-5D42774DB2C6}"/>
+                  </a:ext>
+                </a:extLst>
+              </p:cNvPr>
+              <p:cNvSpPr txBox="1"/>
+              <p:nvPr/>
+            </p:nvSpPr>
+            <p:spPr>
+              <a:xfrm>
+                <a:off x="5500532" y="11088636"/>
+                <a:ext cx="2278411" cy="400110"/>
+              </a:xfrm>
+              <a:prstGeom prst="rect">
+                <a:avLst/>
+              </a:prstGeom>
+              <a:noFill/>
+            </p:spPr>
+            <p:txBody>
+              <a:bodyPr wrap="square" rtlCol="0">
+                <a:spAutoFit/>
+              </a:bodyPr>
+              <a:lstStyle/>
+              <a:p>
+                <a:pPr algn="just"/>
+                <a:r>
+                  <a:rPr lang="es-ES" sz="2000" b="1" dirty="0">
+                    <a:solidFill>
+                      <a:srgbClr val="FAA100"/>
+                    </a:solidFill>
+                    <a:latin typeface="+mj-lt"/>
+                  </a:rPr>
+                  <a:t>sistema IMTA</a:t>
+                </a:r>
+                <a:endParaRPr lang="x-none" sz="2000" b="1" dirty="0">
+                  <a:solidFill>
+                    <a:srgbClr val="FAA100"/>
+                  </a:solidFill>
+                  <a:latin typeface="+mj-lt"/>
+                </a:endParaRPr>
+              </a:p>
+            </p:txBody>
+          </p:sp>
+        </p:grpSp>
+      </p:grpSp>
+      <p:sp>
+        <p:nvSpPr>
+          <p:cNvPr id="79" name="CuadroTexto 78">
+            <a:extLst>
+              <a:ext uri="{FF2B5EF4-FFF2-40B4-BE49-F238E27FC236}">
+                <a16:creationId xmlns:a16="http://schemas.microsoft.com/office/drawing/2014/main" id="{334421D5-D9A7-36F0-B4D2-CE7B66523766}"/>
+              </a:ext>
+            </a:extLst>
+          </p:cNvPr>
+          <p:cNvSpPr txBox="1"/>
+          <p:nvPr/>
+        </p:nvSpPr>
+        <p:spPr>
+          <a:xfrm>
+            <a:off x="870630" y="3444706"/>
+            <a:ext cx="19829827" cy="646331"/>
+          </a:xfrm>
+          <a:prstGeom prst="rect">
+            <a:avLst/>
+          </a:prstGeom>
+          <a:noFill/>
+        </p:spPr>
+        <p:txBody>
+          <a:bodyPr wrap="square" rtlCol="0">
+            <a:spAutoFit/>
+          </a:bodyPr>
+          <a:lstStyle/>
+          <a:p>
+            <a:r>
+              <a:rPr lang="es-ES" sz="3600" dirty="0"/>
+              <a:t>Alberto Coll Fernández</a:t>
+            </a:r>
+          </a:p>
+        </p:txBody>
+      </p:sp>
+      <p:sp>
+        <p:nvSpPr>
+          <p:cNvPr id="81" name="CuadroTexto 80">
+            <a:extLst>
+              <a:ext uri="{FF2B5EF4-FFF2-40B4-BE49-F238E27FC236}">
+                <a16:creationId xmlns:a16="http://schemas.microsoft.com/office/drawing/2014/main" id="{82B90CF0-B45C-982B-BE75-417371147D13}"/>
+              </a:ext>
+            </a:extLst>
+          </p:cNvPr>
+          <p:cNvSpPr txBox="1"/>
+          <p:nvPr/>
+        </p:nvSpPr>
+        <p:spPr>
+          <a:xfrm>
+            <a:off x="13991718" y="4883825"/>
+            <a:ext cx="6319635" cy="523220"/>
+          </a:xfrm>
+          <a:prstGeom prst="rect">
+            <a:avLst/>
+          </a:prstGeom>
+          <a:noFill/>
+        </p:spPr>
+        <p:txBody>
+          <a:bodyPr wrap="square" rtlCol="0">
+            <a:spAutoFit/>
+          </a:bodyPr>
+          <a:lstStyle/>
+          <a:p>
+            <a:r>
+              <a:rPr lang="es-ES" sz="2800" b="1" dirty="0">
+                <a:solidFill>
+                  <a:schemeClr val="bg1"/>
+                </a:solidFill>
+                <a:latin typeface="Cooper Hewitt Semibold" pitchFamily="2" charset="0"/>
+                <a:ea typeface="Cooper Hewitt Semibold" pitchFamily="2" charset="0"/>
+              </a:rPr>
+              <a:t>MATERIALES Y MÉTODOS</a:t>
+            </a:r>
+            <a:endParaRPr lang="x-none" sz="2400" b="1" dirty="0">
+              <a:solidFill>
+                <a:schemeClr val="bg1"/>
+              </a:solidFill>
+              <a:latin typeface="Cooper Hewitt Semibold" pitchFamily="2" charset="0"/>
+              <a:ea typeface="Cooper Hewitt Semibold" pitchFamily="2" charset="0"/>
+            </a:endParaRPr>
+          </a:p>
+        </p:txBody>
+      </p:sp>
+      <p:sp>
+        <p:nvSpPr>
+          <p:cNvPr id="85" name="Rectángulo: esquinas redondeadas 84">
+            <a:extLst>
+              <a:ext uri="{FF2B5EF4-FFF2-40B4-BE49-F238E27FC236}">
+                <a16:creationId xmlns:a16="http://schemas.microsoft.com/office/drawing/2014/main" id="{10D255E8-5F52-6361-3DDF-797F208C4F6D}"/>
+              </a:ext>
+            </a:extLst>
+          </p:cNvPr>
+          <p:cNvSpPr/>
+          <p:nvPr/>
+        </p:nvSpPr>
+        <p:spPr>
+          <a:xfrm>
+            <a:off x="712427" y="12931011"/>
+            <a:ext cx="12633923" cy="1927622"/>
+          </a:xfrm>
+          <a:prstGeom prst="roundRect">
+            <a:avLst>
+              <a:gd name="adj" fmla="val 20149"/>
+            </a:avLst>
+          </a:prstGeom>
+          <a:gradFill flip="none" rotWithShape="1">
+            <a:gsLst>
+              <a:gs pos="0">
+                <a:schemeClr val="bg1">
+                  <a:lumMod val="95000"/>
+                  <a:shade val="30000"/>
+                  <a:satMod val="115000"/>
+                </a:schemeClr>
+              </a:gs>
+              <a:gs pos="0">
+                <a:schemeClr val="bg1">
+                  <a:lumMod val="95000"/>
+                  <a:shade val="67500"/>
+                  <a:satMod val="115000"/>
+                  <a:alpha val="80000"/>
+                </a:schemeClr>
+              </a:gs>
+              <a:gs pos="47000">
+                <a:schemeClr val="bg1">
+                  <a:lumMod val="95000"/>
+                  <a:shade val="100000"/>
+                  <a:satMod val="115000"/>
+                </a:schemeClr>
+              </a:gs>
+            </a:gsLst>
+            <a:lin ang="13500000" scaled="1"/>
+            <a:tileRect/>
+          </a:gradFill>
+          <a:ln>
+            <a:noFill/>
+          </a:ln>
+        </p:spPr>
+        <p:style>
+          <a:lnRef idx="2">
+            <a:schemeClr val="accent1">
+              <a:shade val="50000"/>
+            </a:schemeClr>
+          </a:lnRef>
+          <a:fillRef idx="1">
+            <a:schemeClr val="accent1"/>
+          </a:fillRef>
+          <a:effectRef idx="0">
+            <a:schemeClr val="accent1"/>
+          </a:effectRef>
+          <a:fontRef idx="minor">
+            <a:schemeClr val="lt1"/>
+          </a:fontRef>
+        </p:style>
+        <p:txBody>
+          <a:bodyPr rtlCol="0" anchor="ctr"/>
+          <a:lstStyle/>
+          <a:p>
+            <a:pPr algn="ctr"/>
+            <a:endParaRPr lang="es-ES" dirty="0"/>
+          </a:p>
+        </p:txBody>
+      </p:sp>
+      <p:sp>
+        <p:nvSpPr>
+          <p:cNvPr id="88" name="CuadroTexto 87">
+            <a:extLst>
+              <a:ext uri="{FF2B5EF4-FFF2-40B4-BE49-F238E27FC236}">
+                <a16:creationId xmlns:a16="http://schemas.microsoft.com/office/drawing/2014/main" id="{F1A180F8-CB5A-BF70-5A3D-73AC2DD7B3CA}"/>
+              </a:ext>
+            </a:extLst>
+          </p:cNvPr>
+          <p:cNvSpPr txBox="1"/>
+          <p:nvPr/>
+        </p:nvSpPr>
+        <p:spPr>
+          <a:xfrm>
+            <a:off x="1229303" y="13199069"/>
+            <a:ext cx="11416654" cy="1384995"/>
+          </a:xfrm>
+          <a:prstGeom prst="rect">
+            <a:avLst/>
+          </a:prstGeom>
+          <a:noFill/>
+        </p:spPr>
+        <p:txBody>
+          <a:bodyPr wrap="square">
+            <a:spAutoFit/>
+          </a:bodyPr>
+          <a:lstStyle/>
+          <a:p>
+            <a:pPr algn="ctr"/>
+            <a:r>
+              <a:rPr lang="es-ES" sz="2800" b="1" dirty="0">
+                <a:solidFill>
+                  <a:schemeClr val="tx1">
+                    <a:lumMod val="95000"/>
+                    <a:lumOff val="5000"/>
+                  </a:schemeClr>
+                </a:solidFill>
+              </a:rPr>
+              <a:t>En este trabajo se evaluó el efecto de distintos modos de reproducción de </a:t>
+            </a:r>
+            <a:r>
+              <a:rPr lang="es-ES" sz="2800" b="1" i="1" dirty="0">
+                <a:solidFill>
+                  <a:schemeClr val="tx1">
+                    <a:lumMod val="95000"/>
+                    <a:lumOff val="5000"/>
+                  </a:schemeClr>
+                </a:solidFill>
+              </a:rPr>
+              <a:t>A. </a:t>
+            </a:r>
+            <a:r>
+              <a:rPr lang="es-ES" sz="2800" b="1" i="1" dirty="0" err="1">
+                <a:solidFill>
+                  <a:schemeClr val="tx1">
+                    <a:lumMod val="95000"/>
+                    <a:lumOff val="5000"/>
+                  </a:schemeClr>
+                </a:solidFill>
+              </a:rPr>
+              <a:t>sulcata</a:t>
+            </a:r>
+            <a:r>
+              <a:rPr lang="es-ES" sz="2800" b="1" i="1" dirty="0">
+                <a:solidFill>
+                  <a:schemeClr val="tx1">
+                    <a:lumMod val="95000"/>
+                    <a:lumOff val="5000"/>
+                  </a:schemeClr>
+                </a:solidFill>
+              </a:rPr>
+              <a:t> </a:t>
+            </a:r>
+            <a:r>
+              <a:rPr lang="es-ES" sz="2800" b="1" dirty="0">
+                <a:solidFill>
+                  <a:schemeClr val="tx1">
+                    <a:lumMod val="95000"/>
+                    <a:lumOff val="5000"/>
+                  </a:schemeClr>
+                </a:solidFill>
+              </a:rPr>
+              <a:t>sobre su estado de bienestar en un sistema IMTA, utilizando parámetros del estado oxidativo del animal como indicadores.</a:t>
+            </a:r>
+            <a:endParaRPr lang="x-none" sz="2800" b="1" dirty="0">
+              <a:solidFill>
+                <a:schemeClr val="tx1">
+                  <a:lumMod val="95000"/>
+                  <a:lumOff val="5000"/>
+                </a:schemeClr>
+              </a:solidFill>
+            </a:endParaRPr>
+          </a:p>
+        </p:txBody>
+      </p:sp>
     </p:spTree>
     <p:extLst>
       <p:ext uri="{BB962C8B-B14F-4D97-AF65-F5344CB8AC3E}">

</xml_diff>

<commit_message>
Mat y met seguido
</commit_message>
<xml_diff>
--- a/resultados/poster CEEBI/Poster CEEBI TFG.pptx
+++ b/resultados/poster CEEBI/Poster CEEBI TFG.pptx
@@ -254,7 +254,7 @@
           <a:p>
             <a:fld id="{059ACE22-8852-4AB5-AC4C-388E9F46BA1D}" type="datetimeFigureOut">
               <a:rPr lang="es-ES" smtClean="0"/>
-              <a:t>19/06/2023</a:t>
+              <a:t>21/06/2023</a:t>
             </a:fld>
             <a:endParaRPr lang="es-ES"/>
           </a:p>
@@ -424,7 +424,7 @@
           <a:p>
             <a:fld id="{059ACE22-8852-4AB5-AC4C-388E9F46BA1D}" type="datetimeFigureOut">
               <a:rPr lang="es-ES" smtClean="0"/>
-              <a:t>19/06/2023</a:t>
+              <a:t>21/06/2023</a:t>
             </a:fld>
             <a:endParaRPr lang="es-ES"/>
           </a:p>
@@ -604,7 +604,7 @@
           <a:p>
             <a:fld id="{059ACE22-8852-4AB5-AC4C-388E9F46BA1D}" type="datetimeFigureOut">
               <a:rPr lang="es-ES" smtClean="0"/>
-              <a:t>19/06/2023</a:t>
+              <a:t>21/06/2023</a:t>
             </a:fld>
             <a:endParaRPr lang="es-ES"/>
           </a:p>
@@ -774,7 +774,7 @@
           <a:p>
             <a:fld id="{059ACE22-8852-4AB5-AC4C-388E9F46BA1D}" type="datetimeFigureOut">
               <a:rPr lang="es-ES" smtClean="0"/>
-              <a:t>19/06/2023</a:t>
+              <a:t>21/06/2023</a:t>
             </a:fld>
             <a:endParaRPr lang="es-ES"/>
           </a:p>
@@ -1018,7 +1018,7 @@
           <a:p>
             <a:fld id="{059ACE22-8852-4AB5-AC4C-388E9F46BA1D}" type="datetimeFigureOut">
               <a:rPr lang="es-ES" smtClean="0"/>
-              <a:t>19/06/2023</a:t>
+              <a:t>21/06/2023</a:t>
             </a:fld>
             <a:endParaRPr lang="es-ES"/>
           </a:p>
@@ -1250,7 +1250,7 @@
           <a:p>
             <a:fld id="{059ACE22-8852-4AB5-AC4C-388E9F46BA1D}" type="datetimeFigureOut">
               <a:rPr lang="es-ES" smtClean="0"/>
-              <a:t>19/06/2023</a:t>
+              <a:t>21/06/2023</a:t>
             </a:fld>
             <a:endParaRPr lang="es-ES"/>
           </a:p>
@@ -1617,7 +1617,7 @@
           <a:p>
             <a:fld id="{059ACE22-8852-4AB5-AC4C-388E9F46BA1D}" type="datetimeFigureOut">
               <a:rPr lang="es-ES" smtClean="0"/>
-              <a:t>19/06/2023</a:t>
+              <a:t>21/06/2023</a:t>
             </a:fld>
             <a:endParaRPr lang="es-ES"/>
           </a:p>
@@ -1735,7 +1735,7 @@
           <a:p>
             <a:fld id="{059ACE22-8852-4AB5-AC4C-388E9F46BA1D}" type="datetimeFigureOut">
               <a:rPr lang="es-ES" smtClean="0"/>
-              <a:t>19/06/2023</a:t>
+              <a:t>21/06/2023</a:t>
             </a:fld>
             <a:endParaRPr lang="es-ES"/>
           </a:p>
@@ -1830,7 +1830,7 @@
           <a:p>
             <a:fld id="{059ACE22-8852-4AB5-AC4C-388E9F46BA1D}" type="datetimeFigureOut">
               <a:rPr lang="es-ES" smtClean="0"/>
-              <a:t>19/06/2023</a:t>
+              <a:t>21/06/2023</a:t>
             </a:fld>
             <a:endParaRPr lang="es-ES"/>
           </a:p>
@@ -2107,7 +2107,7 @@
           <a:p>
             <a:fld id="{059ACE22-8852-4AB5-AC4C-388E9F46BA1D}" type="datetimeFigureOut">
               <a:rPr lang="es-ES" smtClean="0"/>
-              <a:t>19/06/2023</a:t>
+              <a:t>21/06/2023</a:t>
             </a:fld>
             <a:endParaRPr lang="es-ES"/>
           </a:p>
@@ -2364,7 +2364,7 @@
           <a:p>
             <a:fld id="{059ACE22-8852-4AB5-AC4C-388E9F46BA1D}" type="datetimeFigureOut">
               <a:rPr lang="es-ES" smtClean="0"/>
-              <a:t>19/06/2023</a:t>
+              <a:t>21/06/2023</a:t>
             </a:fld>
             <a:endParaRPr lang="es-ES"/>
           </a:p>
@@ -2577,7 +2577,7 @@
           <a:p>
             <a:fld id="{059ACE22-8852-4AB5-AC4C-388E9F46BA1D}" type="datetimeFigureOut">
               <a:rPr lang="es-ES" smtClean="0"/>
-              <a:t>19/06/2023</a:t>
+              <a:t>21/06/2023</a:t>
             </a:fld>
             <a:endParaRPr lang="es-ES"/>
           </a:p>
@@ -3095,8 +3095,8 @@
           </p:nvSpPr>
           <p:spPr>
             <a:xfrm>
-              <a:off x="11583325" y="6375151"/>
-              <a:ext cx="9800301" cy="367107"/>
+              <a:off x="11583324" y="6375151"/>
+              <a:ext cx="9800302" cy="199894"/>
             </a:xfrm>
             <a:prstGeom prst="roundRect">
               <a:avLst/>
@@ -3350,7 +3350,7 @@
         </p:nvGrpSpPr>
         <p:grpSpPr>
           <a:xfrm>
-            <a:off x="21881927" y="6201610"/>
+            <a:off x="1752912" y="26720969"/>
             <a:ext cx="12977286" cy="4958661"/>
             <a:chOff x="974247" y="21305958"/>
             <a:chExt cx="8794416" cy="2874652"/>
@@ -4779,7 +4779,7 @@
         </p:blipFill>
         <p:spPr>
           <a:xfrm>
-            <a:off x="-8975575" y="19511944"/>
+            <a:off x="14186320" y="27029467"/>
             <a:ext cx="8572789" cy="4572154"/>
           </a:xfrm>
           <a:prstGeom prst="rect">
@@ -5633,8 +5633,8 @@
         </p:nvSpPr>
         <p:spPr>
           <a:xfrm>
-            <a:off x="14284402" y="6475155"/>
-            <a:ext cx="6084090" cy="1631216"/>
+            <a:off x="18015835" y="11075264"/>
+            <a:ext cx="2420348" cy="1938992"/>
           </a:xfrm>
           <a:prstGeom prst="rect">
             <a:avLst/>
@@ -5650,17 +5650,188 @@
             <a:pPr algn="just"/>
             <a:r>
               <a:rPr lang="es-ES" sz="2000" dirty="0"/>
-              <a:t>Poner simbolitos de macho y hembra en las ultimas anemonas para representar la reproducción sexual. Luego sacar corchete (como el de sistema IMTA ) y poner las variables medidas (SOD, CAT, MDA esenciales). Ver si puedes restringir a dos playas.</a:t>
-            </a:r>
-          </a:p>
-        </p:txBody>
-      </p:sp>
+              <a:t>SOD</a:t>
+            </a:r>
+          </a:p>
+          <a:p>
+            <a:pPr algn="just"/>
+            <a:r>
+              <a:rPr lang="es-ES" sz="2000" dirty="0"/>
+              <a:t>CAT</a:t>
+            </a:r>
+          </a:p>
+          <a:p>
+            <a:pPr algn="just"/>
+            <a:r>
+              <a:rPr lang="es-ES" sz="2000" dirty="0"/>
+              <a:t>Peroxidación lipídica (MDA)</a:t>
+            </a:r>
+          </a:p>
+          <a:p>
+            <a:pPr algn="just"/>
+            <a:r>
+              <a:rPr lang="es-ES" sz="2000" dirty="0"/>
+              <a:t>Capacidad antioxidante total</a:t>
+            </a:r>
+          </a:p>
+        </p:txBody>
+      </p:sp>
+      <p:sp>
+        <p:nvSpPr>
+          <p:cNvPr id="82" name="CuadroTexto 81">
+            <a:extLst>
+              <a:ext uri="{FF2B5EF4-FFF2-40B4-BE49-F238E27FC236}">
+                <a16:creationId xmlns:a16="http://schemas.microsoft.com/office/drawing/2014/main" id="{53CA40A5-3E1F-58D8-BF2E-E804ADE6034F}"/>
+              </a:ext>
+            </a:extLst>
+          </p:cNvPr>
+          <p:cNvSpPr txBox="1"/>
+          <p:nvPr/>
+        </p:nvSpPr>
+        <p:spPr>
+          <a:xfrm>
+            <a:off x="6389153" y="8080540"/>
+            <a:ext cx="6084090" cy="707886"/>
+          </a:xfrm>
+          <a:prstGeom prst="rect">
+            <a:avLst/>
+          </a:prstGeom>
+          <a:noFill/>
+        </p:spPr>
+        <p:txBody>
+          <a:bodyPr wrap="square" rtlCol="0">
+            <a:spAutoFit/>
+          </a:bodyPr>
+          <a:lstStyle/>
+          <a:p>
+            <a:pPr algn="just"/>
+            <a:r>
+              <a:rPr lang="es-ES" sz="2000" dirty="0"/>
+              <a:t>Casi que es mas visual con el esquema del sistema IMTA</a:t>
+            </a:r>
+          </a:p>
+        </p:txBody>
+      </p:sp>
+      <p:sp>
+        <p:nvSpPr>
+          <p:cNvPr id="100" name="CuadroTexto 99">
+            <a:extLst>
+              <a:ext uri="{FF2B5EF4-FFF2-40B4-BE49-F238E27FC236}">
+                <a16:creationId xmlns:a16="http://schemas.microsoft.com/office/drawing/2014/main" id="{9D3DB3A5-0DA1-4BB9-9B0D-46B9BE39F2FE}"/>
+              </a:ext>
+            </a:extLst>
+          </p:cNvPr>
+          <p:cNvSpPr txBox="1"/>
+          <p:nvPr/>
+        </p:nvSpPr>
+        <p:spPr>
+          <a:xfrm>
+            <a:off x="15099166" y="5704679"/>
+            <a:ext cx="4447795" cy="707886"/>
+          </a:xfrm>
+          <a:prstGeom prst="rect">
+            <a:avLst/>
+          </a:prstGeom>
+          <a:noFill/>
+        </p:spPr>
+        <p:txBody>
+          <a:bodyPr wrap="square" rtlCol="0">
+            <a:spAutoFit/>
+          </a:bodyPr>
+          <a:lstStyle/>
+          <a:p>
+            <a:pPr algn="ctr"/>
+            <a:r>
+              <a:rPr lang="es-ES" sz="2000" dirty="0"/>
+              <a:t>Anémonas procedentes de </a:t>
+            </a:r>
+            <a:r>
+              <a:rPr lang="es-ES" sz="2000" b="1" dirty="0">
+                <a:solidFill>
+                  <a:schemeClr val="accent2"/>
+                </a:solidFill>
+              </a:rPr>
+              <a:t>Calahonda</a:t>
+            </a:r>
+            <a:r>
+              <a:rPr lang="es-ES" sz="2000" dirty="0"/>
+              <a:t>, </a:t>
+            </a:r>
+            <a:r>
+              <a:rPr lang="es-ES" sz="2000" b="1" dirty="0">
+                <a:solidFill>
+                  <a:schemeClr val="accent3"/>
+                </a:solidFill>
+              </a:rPr>
+              <a:t>Almuñécar</a:t>
+            </a:r>
+            <a:r>
+              <a:rPr lang="es-ES" sz="2000" dirty="0"/>
+              <a:t> y </a:t>
+            </a:r>
+            <a:r>
+              <a:rPr lang="es-ES" sz="2000" b="1" dirty="0">
+                <a:solidFill>
+                  <a:schemeClr val="accent6"/>
+                </a:solidFill>
+              </a:rPr>
+              <a:t>Salobreña</a:t>
+            </a:r>
+          </a:p>
+        </p:txBody>
+      </p:sp>
+      <p:cxnSp>
+        <p:nvCxnSpPr>
+          <p:cNvPr id="102" name="Conector recto 101">
+            <a:extLst>
+              <a:ext uri="{FF2B5EF4-FFF2-40B4-BE49-F238E27FC236}">
+                <a16:creationId xmlns:a16="http://schemas.microsoft.com/office/drawing/2014/main" id="{6546EE5C-0833-40C5-BF3B-C8ABEA914105}"/>
+              </a:ext>
+            </a:extLst>
+          </p:cNvPr>
+          <p:cNvCxnSpPr>
+            <a:cxnSpLocks/>
+          </p:cNvCxnSpPr>
+          <p:nvPr/>
+        </p:nvCxnSpPr>
+        <p:spPr>
+          <a:xfrm>
+            <a:off x="17323062" y="6463355"/>
+            <a:ext cx="0" cy="419886"/>
+          </a:xfrm>
+          <a:prstGeom prst="line">
+            <a:avLst/>
+          </a:prstGeom>
+          <a:ln w="38100">
+            <a:solidFill>
+              <a:schemeClr val="accent2"/>
+            </a:solidFill>
+            <a:prstDash val="solid"/>
+            <a:headEnd type="none" w="med" len="med"/>
+            <a:tailEnd type="arrow" w="med" len="med"/>
+          </a:ln>
+        </p:spPr>
+        <p:style>
+          <a:lnRef idx="1">
+            <a:schemeClr val="accent1"/>
+          </a:lnRef>
+          <a:fillRef idx="0">
+            <a:schemeClr val="accent1"/>
+          </a:fillRef>
+          <a:effectRef idx="0">
+            <a:schemeClr val="accent1"/>
+          </a:effectRef>
+          <a:fontRef idx="minor">
+            <a:schemeClr val="tx1"/>
+          </a:fontRef>
+        </p:style>
+      </p:cxnSp>
       <p:grpSp>
         <p:nvGrpSpPr>
-          <p:cNvPr id="68" name="Grupo 67">
+          <p:cNvPr id="107" name="Grupo 106">
             <a:extLst>
               <a:ext uri="{FF2B5EF4-FFF2-40B4-BE49-F238E27FC236}">
-                <a16:creationId xmlns:a16="http://schemas.microsoft.com/office/drawing/2014/main" id="{8A0DF943-91BA-0AB5-7F76-53538A007036}"/>
+                <a16:creationId xmlns:a16="http://schemas.microsoft.com/office/drawing/2014/main" id="{A3DF9C02-58CA-4543-A7C9-EE1144170FE2}"/>
               </a:ext>
             </a:extLst>
           </p:cNvPr>
@@ -5669,18 +5840,65 @@
         </p:nvGrpSpPr>
         <p:grpSpPr>
           <a:xfrm>
-            <a:off x="14039302" y="8530075"/>
-            <a:ext cx="6239758" cy="2636866"/>
-            <a:chOff x="14095611" y="8683057"/>
-            <a:chExt cx="6239758" cy="2636866"/>
+            <a:off x="14017557" y="7438705"/>
+            <a:ext cx="6418625" cy="5639908"/>
+            <a:chOff x="14067590" y="7786353"/>
+            <a:chExt cx="6418625" cy="5639908"/>
           </a:xfrm>
         </p:grpSpPr>
+        <p:pic>
+          <p:nvPicPr>
+            <p:cNvPr id="45" name="Imagen 44">
+              <a:extLst>
+                <a:ext uri="{FF2B5EF4-FFF2-40B4-BE49-F238E27FC236}">
+                  <a16:creationId xmlns:a16="http://schemas.microsoft.com/office/drawing/2014/main" id="{2375F5ED-DA62-701D-5E10-BF9C1C6BD105}"/>
+                </a:ext>
+              </a:extLst>
+            </p:cNvPr>
+            <p:cNvPicPr>
+              <a:picLocks noChangeAspect="1"/>
+            </p:cNvPicPr>
+            <p:nvPr/>
+          </p:nvPicPr>
+          <p:blipFill rotWithShape="1">
+            <a:blip r:embed="rId10">
+              <a:clrChange>
+                <a:clrFrom>
+                  <a:srgbClr val="FFFFFF"/>
+                </a:clrFrom>
+                <a:clrTo>
+                  <a:srgbClr val="FFFFFF">
+                    <a:alpha val="0"/>
+                  </a:srgbClr>
+                </a:clrTo>
+              </a:clrChange>
+              <a:duotone>
+                <a:schemeClr val="accent3">
+                  <a:shade val="45000"/>
+                  <a:satMod val="135000"/>
+                </a:schemeClr>
+                <a:prstClr val="white"/>
+              </a:duotone>
+            </a:blip>
+            <a:srcRect l="15918" r="15583" b="80505"/>
+            <a:stretch/>
+          </p:blipFill>
+          <p:spPr>
+            <a:xfrm>
+              <a:off x="14067590" y="8430440"/>
+              <a:ext cx="2381407" cy="1884833"/>
+            </a:xfrm>
+            <a:prstGeom prst="rect">
+              <a:avLst/>
+            </a:prstGeom>
+          </p:spPr>
+        </p:pic>
         <p:cxnSp>
           <p:nvCxnSpPr>
-            <p:cNvPr id="57" name="Conector recto 56">
+            <p:cNvPr id="60" name="Conector recto 59">
               <a:extLst>
                 <a:ext uri="{FF2B5EF4-FFF2-40B4-BE49-F238E27FC236}">
-                  <a16:creationId xmlns:a16="http://schemas.microsoft.com/office/drawing/2014/main" id="{FD8B8B51-2D61-DFEB-BA54-02BFD079B533}"/>
+                  <a16:creationId xmlns:a16="http://schemas.microsoft.com/office/drawing/2014/main" id="{420C574E-8DA4-97BF-0855-6857CCF55701}"/>
                 </a:ext>
               </a:extLst>
             </p:cNvPr>
@@ -5691,8 +5909,54 @@
           </p:nvCxnSpPr>
           <p:spPr>
             <a:xfrm>
-              <a:off x="15096532" y="8683057"/>
-              <a:ext cx="0" cy="357585"/>
+              <a:off x="16402620" y="9261324"/>
+              <a:ext cx="711877" cy="0"/>
+            </a:xfrm>
+            <a:prstGeom prst="line">
+              <a:avLst/>
+            </a:prstGeom>
+            <a:ln w="38100">
+              <a:solidFill>
+                <a:schemeClr val="accent2"/>
+              </a:solidFill>
+              <a:prstDash val="solid"/>
+              <a:headEnd type="none" w="med" len="med"/>
+              <a:tailEnd type="arrow" w="med" len="med"/>
+            </a:ln>
+          </p:spPr>
+          <p:style>
+            <a:lnRef idx="1">
+              <a:schemeClr val="accent1"/>
+            </a:lnRef>
+            <a:fillRef idx="0">
+              <a:schemeClr val="accent1"/>
+            </a:fillRef>
+            <a:effectRef idx="0">
+              <a:schemeClr val="accent1"/>
+            </a:effectRef>
+            <a:fontRef idx="minor">
+              <a:schemeClr val="tx1"/>
+            </a:fontRef>
+          </p:style>
+        </p:cxnSp>
+        <p:cxnSp>
+          <p:nvCxnSpPr>
+            <p:cNvPr id="84" name="Conector recto 83">
+              <a:extLst>
+                <a:ext uri="{FF2B5EF4-FFF2-40B4-BE49-F238E27FC236}">
+                  <a16:creationId xmlns:a16="http://schemas.microsoft.com/office/drawing/2014/main" id="{8908F34B-D0D0-48DA-806A-CB1197ACF52C}"/>
+                </a:ext>
+              </a:extLst>
+            </p:cNvPr>
+            <p:cNvCxnSpPr>
+              <a:cxnSpLocks/>
+            </p:cNvCxnSpPr>
+            <p:nvPr/>
+          </p:nvCxnSpPr>
+          <p:spPr>
+            <a:xfrm>
+              <a:off x="16758558" y="9270065"/>
+              <a:ext cx="0" cy="1512235"/>
             </a:xfrm>
             <a:prstGeom prst="line">
               <a:avLst/>
@@ -5723,10 +5987,10 @@
         </p:cxnSp>
         <p:grpSp>
           <p:nvGrpSpPr>
-            <p:cNvPr id="67" name="Grupo 66">
+            <p:cNvPr id="93" name="Grupo 92">
               <a:extLst>
                 <a:ext uri="{FF2B5EF4-FFF2-40B4-BE49-F238E27FC236}">
-                  <a16:creationId xmlns:a16="http://schemas.microsoft.com/office/drawing/2014/main" id="{52F93877-8914-8F89-32E7-27FC19034E3C}"/>
+                  <a16:creationId xmlns:a16="http://schemas.microsoft.com/office/drawing/2014/main" id="{F77EE44C-DBCA-4B1B-B3B2-49EBC26FE9F8}"/>
                 </a:ext>
               </a:extLst>
             </p:cNvPr>
@@ -5735,18 +5999,18 @@
           </p:nvGrpSpPr>
           <p:grpSpPr>
             <a:xfrm>
-              <a:off x="14095611" y="9102106"/>
-              <a:ext cx="6239758" cy="2217817"/>
-              <a:chOff x="14095611" y="9102106"/>
-              <a:chExt cx="6239758" cy="2217817"/>
+              <a:off x="14212085" y="10794202"/>
+              <a:ext cx="3493041" cy="2260591"/>
+              <a:chOff x="12747455" y="11764169"/>
+              <a:chExt cx="3493041" cy="2260591"/>
             </a:xfrm>
           </p:grpSpPr>
           <p:pic>
             <p:nvPicPr>
-              <p:cNvPr id="45" name="Imagen 44">
+              <p:cNvPr id="80" name="Imagen 79">
                 <a:extLst>
                   <a:ext uri="{FF2B5EF4-FFF2-40B4-BE49-F238E27FC236}">
-                    <a16:creationId xmlns:a16="http://schemas.microsoft.com/office/drawing/2014/main" id="{2375F5ED-DA62-701D-5E10-BF9C1C6BD105}"/>
+                    <a16:creationId xmlns:a16="http://schemas.microsoft.com/office/drawing/2014/main" id="{9D517BD0-82DD-142A-9FA4-D7816A06D7E4}"/>
                   </a:ext>
                 </a:extLst>
               </p:cNvPr>
@@ -5775,19 +6039,126 @@
                   <a:prstClr val="white"/>
                 </a:duotone>
               </a:blip>
-              <a:srcRect l="15918" r="15583" b="80505"/>
+              <a:srcRect l="779" t="77324" r="779" b="-290"/>
               <a:stretch/>
             </p:blipFill>
             <p:spPr>
               <a:xfrm>
-                <a:off x="14095611" y="9520986"/>
-                <a:ext cx="2049331" cy="1622002"/>
+                <a:off x="12747455" y="11764169"/>
+                <a:ext cx="3493041" cy="2260591"/>
               </a:xfrm>
               <a:prstGeom prst="rect">
                 <a:avLst/>
               </a:prstGeom>
             </p:spPr>
           </p:pic>
+          <p:pic>
+            <p:nvPicPr>
+              <p:cNvPr id="63" name="Imagen 62">
+                <a:extLst>
+                  <a:ext uri="{FF2B5EF4-FFF2-40B4-BE49-F238E27FC236}">
+                    <a16:creationId xmlns:a16="http://schemas.microsoft.com/office/drawing/2014/main" id="{22BAE815-F90D-4317-B3BE-B851C411B352}"/>
+                  </a:ext>
+                </a:extLst>
+              </p:cNvPr>
+              <p:cNvPicPr>
+                <a:picLocks noChangeAspect="1"/>
+              </p:cNvPicPr>
+              <p:nvPr/>
+            </p:nvPicPr>
+            <p:blipFill>
+              <a:blip r:embed="rId11">
+                <a:duotone>
+                  <a:schemeClr val="accent6">
+                    <a:shade val="45000"/>
+                    <a:satMod val="135000"/>
+                  </a:schemeClr>
+                  <a:prstClr val="white"/>
+                </a:duotone>
+                <a:extLst>
+                  <a:ext uri="{28A0092B-C50C-407E-A947-70E740481C1C}">
+                    <a14:useLocalDpi xmlns:a14="http://schemas.microsoft.com/office/drawing/2010/main" val="0"/>
+                  </a:ext>
+                </a:extLst>
+              </a:blip>
+              <a:stretch>
+                <a:fillRect/>
+              </a:stretch>
+            </p:blipFill>
+            <p:spPr>
+              <a:xfrm>
+                <a:off x="13229755" y="12980184"/>
+                <a:ext cx="487809" cy="682594"/>
+              </a:xfrm>
+              <a:prstGeom prst="rect">
+                <a:avLst/>
+              </a:prstGeom>
+            </p:spPr>
+          </p:pic>
+          <p:pic>
+            <p:nvPicPr>
+              <p:cNvPr id="86" name="Imagen 85">
+                <a:extLst>
+                  <a:ext uri="{FF2B5EF4-FFF2-40B4-BE49-F238E27FC236}">
+                    <a16:creationId xmlns:a16="http://schemas.microsoft.com/office/drawing/2014/main" id="{E952863C-F8C5-4478-AFCC-D42BE644E466}"/>
+                  </a:ext>
+                </a:extLst>
+              </p:cNvPr>
+              <p:cNvPicPr>
+                <a:picLocks noChangeAspect="1"/>
+              </p:cNvPicPr>
+              <p:nvPr/>
+            </p:nvPicPr>
+            <p:blipFill>
+              <a:blip r:embed="rId12">
+                <a:duotone>
+                  <a:schemeClr val="accent6">
+                    <a:shade val="45000"/>
+                    <a:satMod val="135000"/>
+                  </a:schemeClr>
+                  <a:prstClr val="white"/>
+                </a:duotone>
+                <a:extLst>
+                  <a:ext uri="{28A0092B-C50C-407E-A947-70E740481C1C}">
+                    <a14:useLocalDpi xmlns:a14="http://schemas.microsoft.com/office/drawing/2010/main" val="0"/>
+                  </a:ext>
+                </a:extLst>
+              </a:blip>
+              <a:stretch>
+                <a:fillRect/>
+              </a:stretch>
+            </p:blipFill>
+            <p:spPr>
+              <a:xfrm>
+                <a:off x="15139154" y="12980184"/>
+                <a:ext cx="611455" cy="611455"/>
+              </a:xfrm>
+              <a:prstGeom prst="rect">
+                <a:avLst/>
+              </a:prstGeom>
+            </p:spPr>
+          </p:pic>
+        </p:grpSp>
+        <p:grpSp>
+          <p:nvGrpSpPr>
+            <p:cNvPr id="91" name="Grupo 90">
+              <a:extLst>
+                <a:ext uri="{FF2B5EF4-FFF2-40B4-BE49-F238E27FC236}">
+                  <a16:creationId xmlns:a16="http://schemas.microsoft.com/office/drawing/2014/main" id="{126E1B4E-DFBA-485E-A468-25B70E48BE7D}"/>
+                </a:ext>
+              </a:extLst>
+            </p:cNvPr>
+            <p:cNvGrpSpPr/>
+            <p:nvPr/>
+          </p:nvGrpSpPr>
+          <p:grpSpPr>
+            <a:xfrm>
+              <a:off x="16933947" y="8225772"/>
+              <a:ext cx="3552268" cy="2200894"/>
+              <a:chOff x="16758559" y="8273405"/>
+              <a:chExt cx="3552268" cy="2200894"/>
+            </a:xfrm>
+          </p:grpSpPr>
           <p:pic>
             <p:nvPicPr>
               <p:cNvPr id="47" name="Imagen 46">
@@ -5827,159 +6198,231 @@
             </p:blipFill>
             <p:spPr>
               <a:xfrm>
-                <a:off x="17382831" y="9409129"/>
-                <a:ext cx="2952538" cy="1910794"/>
+                <a:off x="16910030" y="8273405"/>
+                <a:ext cx="3400797" cy="2200894"/>
               </a:xfrm>
               <a:prstGeom prst="rect">
                 <a:avLst/>
               </a:prstGeom>
             </p:spPr>
           </p:pic>
-          <p:cxnSp>
-            <p:nvCxnSpPr>
-              <p:cNvPr id="52" name="Conector recto 51">
+          <p:pic>
+            <p:nvPicPr>
+              <p:cNvPr id="90" name="Imagen 89">
                 <a:extLst>
                   <a:ext uri="{FF2B5EF4-FFF2-40B4-BE49-F238E27FC236}">
-                    <a16:creationId xmlns:a16="http://schemas.microsoft.com/office/drawing/2014/main" id="{4CBFE342-6B59-D4E6-754B-1FFD1E2D9AC5}"/>
+                    <a16:creationId xmlns:a16="http://schemas.microsoft.com/office/drawing/2014/main" id="{FF55AA16-CFA9-41BA-8C1B-150993C590A6}"/>
                   </a:ext>
                 </a:extLst>
               </p:cNvPr>
-              <p:cNvCxnSpPr>
-                <a:cxnSpLocks/>
-              </p:cNvCxnSpPr>
+              <p:cNvPicPr>
+                <a:picLocks noChangeAspect="1"/>
+              </p:cNvPicPr>
               <p:nvPr/>
-            </p:nvCxnSpPr>
+            </p:nvPicPr>
+            <p:blipFill rotWithShape="1">
+              <a:blip r:embed="rId10">
+                <a:clrChange>
+                  <a:clrFrom>
+                    <a:srgbClr val="FFFFFF"/>
+                  </a:clrFrom>
+                  <a:clrTo>
+                    <a:srgbClr val="FFFFFF">
+                      <a:alpha val="0"/>
+                    </a:srgbClr>
+                  </a:clrTo>
+                </a:clrChange>
+                <a:duotone>
+                  <a:schemeClr val="accent3">
+                    <a:shade val="45000"/>
+                    <a:satMod val="135000"/>
+                  </a:schemeClr>
+                  <a:prstClr val="white"/>
+                </a:duotone>
+              </a:blip>
+              <a:srcRect l="15007" t="10823" r="78417" b="81878"/>
+              <a:stretch/>
+            </p:blipFill>
             <p:spPr>
               <a:xfrm>
-                <a:off x="15096532" y="9102106"/>
-                <a:ext cx="0" cy="2200894"/>
+                <a:off x="16758559" y="9563771"/>
+                <a:ext cx="169055" cy="511923"/>
               </a:xfrm>
-              <a:prstGeom prst="line">
+              <a:prstGeom prst="rect">
                 <a:avLst/>
               </a:prstGeom>
-              <a:ln w="38100">
-                <a:solidFill>
-                  <a:schemeClr val="accent2"/>
-                </a:solidFill>
-                <a:prstDash val="sysDash"/>
-              </a:ln>
             </p:spPr>
-            <p:style>
-              <a:lnRef idx="1">
-                <a:schemeClr val="accent1"/>
-              </a:lnRef>
-              <a:fillRef idx="0">
-                <a:schemeClr val="accent1"/>
-              </a:fillRef>
-              <a:effectRef idx="0">
-                <a:schemeClr val="accent1"/>
-              </a:effectRef>
-              <a:fontRef idx="minor">
-                <a:schemeClr val="tx1"/>
-              </a:fontRef>
-            </p:style>
-          </p:cxnSp>
-          <p:cxnSp>
-            <p:nvCxnSpPr>
-              <p:cNvPr id="60" name="Conector recto 59">
-                <a:extLst>
-                  <a:ext uri="{FF2B5EF4-FFF2-40B4-BE49-F238E27FC236}">
-                    <a16:creationId xmlns:a16="http://schemas.microsoft.com/office/drawing/2014/main" id="{420C574E-8DA4-97BF-0855-6857CCF55701}"/>
-                  </a:ext>
-                </a:extLst>
-              </p:cNvPr>
-              <p:cNvCxnSpPr>
-                <a:cxnSpLocks/>
-              </p:cNvCxnSpPr>
-              <p:nvPr/>
-            </p:nvCxnSpPr>
-            <p:spPr>
-              <a:xfrm>
-                <a:off x="16095315" y="10362025"/>
-                <a:ext cx="1077882" cy="0"/>
-              </a:xfrm>
-              <a:prstGeom prst="line">
-                <a:avLst/>
-              </a:prstGeom>
-              <a:ln w="38100">
-                <a:solidFill>
-                  <a:schemeClr val="accent2"/>
-                </a:solidFill>
-                <a:prstDash val="solid"/>
-                <a:headEnd type="none" w="med" len="med"/>
-                <a:tailEnd type="arrow" w="med" len="med"/>
-              </a:ln>
-            </p:spPr>
-            <p:style>
-              <a:lnRef idx="1">
-                <a:schemeClr val="accent1"/>
-              </a:lnRef>
-              <a:fillRef idx="0">
-                <a:schemeClr val="accent1"/>
-              </a:fillRef>
-              <a:effectRef idx="0">
-                <a:schemeClr val="accent1"/>
-              </a:effectRef>
-              <a:fontRef idx="minor">
-                <a:schemeClr val="tx1"/>
-              </a:fontRef>
-            </p:style>
-          </p:cxnSp>
+          </p:pic>
         </p:grpSp>
+        <p:cxnSp>
+          <p:nvCxnSpPr>
+            <p:cNvPr id="57" name="Conector recto 56">
+              <a:extLst>
+                <a:ext uri="{FF2B5EF4-FFF2-40B4-BE49-F238E27FC236}">
+                  <a16:creationId xmlns:a16="http://schemas.microsoft.com/office/drawing/2014/main" id="{FD8B8B51-2D61-DFEB-BA54-02BFD079B533}"/>
+                </a:ext>
+              </a:extLst>
+            </p:cNvPr>
+            <p:cNvCxnSpPr>
+              <a:cxnSpLocks/>
+            </p:cNvCxnSpPr>
+            <p:nvPr/>
+          </p:nvCxnSpPr>
+          <p:spPr>
+            <a:xfrm>
+              <a:off x="15234421" y="7786353"/>
+              <a:ext cx="0" cy="357585"/>
+            </a:xfrm>
+            <a:prstGeom prst="line">
+              <a:avLst/>
+            </a:prstGeom>
+            <a:ln w="38100">
+              <a:solidFill>
+                <a:schemeClr val="accent2"/>
+              </a:solidFill>
+              <a:prstDash val="solid"/>
+              <a:headEnd type="none" w="med" len="med"/>
+              <a:tailEnd type="arrow" w="med" len="med"/>
+            </a:ln>
+          </p:spPr>
+          <p:style>
+            <a:lnRef idx="1">
+              <a:schemeClr val="accent1"/>
+            </a:lnRef>
+            <a:fillRef idx="0">
+              <a:schemeClr val="accent1"/>
+            </a:fillRef>
+            <a:effectRef idx="0">
+              <a:schemeClr val="accent1"/>
+            </a:effectRef>
+            <a:fontRef idx="minor">
+              <a:schemeClr val="tx1"/>
+            </a:fontRef>
+          </p:style>
+        </p:cxnSp>
+        <p:cxnSp>
+          <p:nvCxnSpPr>
+            <p:cNvPr id="52" name="Conector recto 51">
+              <a:extLst>
+                <a:ext uri="{FF2B5EF4-FFF2-40B4-BE49-F238E27FC236}">
+                  <a16:creationId xmlns:a16="http://schemas.microsoft.com/office/drawing/2014/main" id="{4CBFE342-6B59-D4E6-754B-1FFD1E2D9AC5}"/>
+                </a:ext>
+              </a:extLst>
+            </p:cNvPr>
+            <p:cNvCxnSpPr>
+              <a:cxnSpLocks/>
+            </p:cNvCxnSpPr>
+            <p:nvPr/>
+          </p:nvCxnSpPr>
+          <p:spPr>
+            <a:xfrm>
+              <a:off x="15234421" y="8248611"/>
+              <a:ext cx="0" cy="2200894"/>
+            </a:xfrm>
+            <a:prstGeom prst="line">
+              <a:avLst/>
+            </a:prstGeom>
+            <a:ln w="38100">
+              <a:solidFill>
+                <a:schemeClr val="accent2"/>
+              </a:solidFill>
+              <a:prstDash val="sysDash"/>
+            </a:ln>
+          </p:spPr>
+          <p:style>
+            <a:lnRef idx="1">
+              <a:schemeClr val="accent1"/>
+            </a:lnRef>
+            <a:fillRef idx="0">
+              <a:schemeClr val="accent1"/>
+            </a:fillRef>
+            <a:effectRef idx="0">
+              <a:schemeClr val="accent1"/>
+            </a:effectRef>
+            <a:fontRef idx="minor">
+              <a:schemeClr val="tx1"/>
+            </a:fontRef>
+          </p:style>
+        </p:cxnSp>
+        <p:sp>
+          <p:nvSpPr>
+            <p:cNvPr id="104" name="CuadroTexto 103">
+              <a:extLst>
+                <a:ext uri="{FF2B5EF4-FFF2-40B4-BE49-F238E27FC236}">
+                  <a16:creationId xmlns:a16="http://schemas.microsoft.com/office/drawing/2014/main" id="{31C8BCDC-7E82-4342-9912-CC27E0615D62}"/>
+                </a:ext>
+              </a:extLst>
+            </p:cNvPr>
+            <p:cNvSpPr txBox="1"/>
+            <p:nvPr/>
+          </p:nvSpPr>
+          <p:spPr>
+            <a:xfrm>
+              <a:off x="17527558" y="7986686"/>
+              <a:ext cx="2642412" cy="400110"/>
+            </a:xfrm>
+            <a:prstGeom prst="rect">
+              <a:avLst/>
+            </a:prstGeom>
+            <a:noFill/>
+          </p:spPr>
+          <p:txBody>
+            <a:bodyPr wrap="square" rtlCol="0">
+              <a:spAutoFit/>
+            </a:bodyPr>
+            <a:lstStyle/>
+            <a:p>
+              <a:pPr algn="ctr"/>
+              <a:r>
+                <a:rPr lang="es-ES" sz="2000" dirty="0"/>
+                <a:t>Reproducción asexual</a:t>
+              </a:r>
+            </a:p>
+          </p:txBody>
+        </p:sp>
+        <p:sp>
+          <p:nvSpPr>
+            <p:cNvPr id="105" name="CuadroTexto 104">
+              <a:extLst>
+                <a:ext uri="{FF2B5EF4-FFF2-40B4-BE49-F238E27FC236}">
+                  <a16:creationId xmlns:a16="http://schemas.microsoft.com/office/drawing/2014/main" id="{A6D12ED8-803A-4804-842E-7F0E79262B61}"/>
+                </a:ext>
+              </a:extLst>
+            </p:cNvPr>
+            <p:cNvSpPr txBox="1"/>
+            <p:nvPr/>
+          </p:nvSpPr>
+          <p:spPr>
+            <a:xfrm>
+              <a:off x="14572827" y="13026151"/>
+              <a:ext cx="2642412" cy="400110"/>
+            </a:xfrm>
+            <a:prstGeom prst="rect">
+              <a:avLst/>
+            </a:prstGeom>
+            <a:noFill/>
+          </p:spPr>
+          <p:txBody>
+            <a:bodyPr wrap="square" rtlCol="0">
+              <a:spAutoFit/>
+            </a:bodyPr>
+            <a:lstStyle/>
+            <a:p>
+              <a:pPr algn="ctr"/>
+              <a:r>
+                <a:rPr lang="es-ES" sz="2000" dirty="0"/>
+                <a:t>Maduración sexual</a:t>
+              </a:r>
+            </a:p>
+          </p:txBody>
+        </p:sp>
       </p:grpSp>
-      <p:pic>
-        <p:nvPicPr>
-          <p:cNvPr id="80" name="Imagen 79">
+      <p:sp>
+        <p:nvSpPr>
+          <p:cNvPr id="108" name="CuadroTexto 107">
             <a:extLst>
               <a:ext uri="{FF2B5EF4-FFF2-40B4-BE49-F238E27FC236}">
-                <a16:creationId xmlns:a16="http://schemas.microsoft.com/office/drawing/2014/main" id="{9D517BD0-82DD-142A-9FA4-D7816A06D7E4}"/>
-              </a:ext>
-            </a:extLst>
-          </p:cNvPr>
-          <p:cNvPicPr>
-            <a:picLocks noChangeAspect="1"/>
-          </p:cNvPicPr>
-          <p:nvPr/>
-        </p:nvPicPr>
-        <p:blipFill rotWithShape="1">
-          <a:blip r:embed="rId10">
-            <a:clrChange>
-              <a:clrFrom>
-                <a:srgbClr val="FFFFFF"/>
-              </a:clrFrom>
-              <a:clrTo>
-                <a:srgbClr val="FFFFFF">
-                  <a:alpha val="0"/>
-                </a:srgbClr>
-              </a:clrTo>
-            </a:clrChange>
-            <a:duotone>
-              <a:schemeClr val="accent3">
-                <a:shade val="45000"/>
-                <a:satMod val="135000"/>
-              </a:schemeClr>
-              <a:prstClr val="white"/>
-            </a:duotone>
-          </a:blip>
-          <a:srcRect l="779" t="77324" r="779" b="-290"/>
-          <a:stretch/>
-        </p:blipFill>
-        <p:spPr>
-          <a:xfrm>
-            <a:off x="17326522" y="11771577"/>
-            <a:ext cx="2952538" cy="1910794"/>
-          </a:xfrm>
-          <a:prstGeom prst="rect">
-            <a:avLst/>
-          </a:prstGeom>
-        </p:spPr>
-      </p:pic>
-      <p:sp>
-        <p:nvSpPr>
-          <p:cNvPr id="82" name="CuadroTexto 81">
-            <a:extLst>
-              <a:ext uri="{FF2B5EF4-FFF2-40B4-BE49-F238E27FC236}">
-                <a16:creationId xmlns:a16="http://schemas.microsoft.com/office/drawing/2014/main" id="{53CA40A5-3E1F-58D8-BF2E-E804ADE6034F}"/>
+                <a16:creationId xmlns:a16="http://schemas.microsoft.com/office/drawing/2014/main" id="{7A0DEE2C-97BE-4775-B655-1F9486FE9351}"/>
               </a:ext>
             </a:extLst>
           </p:cNvPr>
@@ -5988,8 +6431,8 @@
         </p:nvSpPr>
         <p:spPr>
           <a:xfrm>
-            <a:off x="6389153" y="8080540"/>
-            <a:ext cx="6084090" cy="707886"/>
+            <a:off x="15271519" y="6986452"/>
+            <a:ext cx="4103086" cy="400110"/>
           </a:xfrm>
           <a:prstGeom prst="rect">
             <a:avLst/>
@@ -6002,10 +6445,10 @@
           </a:bodyPr>
           <a:lstStyle/>
           <a:p>
-            <a:pPr algn="just"/>
-            <a:r>
-              <a:rPr lang="es-ES" sz="2000" dirty="0"/>
-              <a:t>Casi que es mas visual con el esquema del sistema IMTA</a:t>
+            <a:pPr algn="ctr"/>
+            <a:r>
+              <a:rPr lang="es-ES" sz="2000" b="1" dirty="0"/>
+              <a:t>Dos modos de reproducción</a:t>
             </a:r>
           </a:p>
         </p:txBody>

</xml_diff>